<commit_message>
SG: HOTFIX: updated presentation
</commit_message>
<xml_diff>
--- a/Documentation/qa-tdl-presentation.pptx
+++ b/Documentation/qa-tdl-presentation.pptx
@@ -17,10 +17,10 @@
     <p:sldId id="269" r:id="rId8"/>
     <p:sldId id="285" r:id="rId9"/>
     <p:sldId id="286" r:id="rId10"/>
-    <p:sldId id="275" r:id="rId11"/>
-    <p:sldId id="282" r:id="rId12"/>
-    <p:sldId id="287" r:id="rId13"/>
-    <p:sldId id="288" r:id="rId14"/>
+    <p:sldId id="289" r:id="rId11"/>
+    <p:sldId id="275" r:id="rId12"/>
+    <p:sldId id="282" r:id="rId13"/>
+    <p:sldId id="291" r:id="rId14"/>
     <p:sldId id="270" r:id="rId15"/>
     <p:sldId id="271" r:id="rId16"/>
     <p:sldId id="276" r:id="rId17"/>
@@ -613,36 +613,7 @@
           <a:bodyPr/>
           <a:lstStyle/>
           <a:p>
-            <a:r>
-              <a:rPr lang="en-GB" baseline="0" dirty="0"/>
-              <a:t>As it stands, there is complete CRUD functionality on the customers, items and orders in my project.</a:t>
-            </a:r>
-          </a:p>
-          <a:p>
             <a:endParaRPr lang="en-GB" baseline="0" dirty="0"/>
-          </a:p>
-          <a:p>
-            <a:r>
-              <a:rPr lang="en-GB" baseline="0" dirty="0"/>
-              <a:t>All </a:t>
-            </a:r>
-            <a:r>
-              <a:rPr lang="en-GB" baseline="0" dirty="0" err="1"/>
-              <a:t>diagreams</a:t>
-            </a:r>
-            <a:r>
-              <a:rPr lang="en-GB" baseline="0" dirty="0"/>
-              <a:t> such as ERDs, UMLs and necessary docs such as risk assessment were completed and included with no issue. </a:t>
-            </a:r>
-          </a:p>
-          <a:p>
-            <a:endParaRPr lang="en-GB" baseline="0" dirty="0"/>
-          </a:p>
-          <a:p>
-            <a:r>
-              <a:rPr lang="en-GB" baseline="0" dirty="0"/>
-              <a:t>The majority of continuous integration aspects. A feature-branch model within the repo, for example. It was however lacking in other areas, we’ll move onto that in…</a:t>
-            </a:r>
           </a:p>
         </p:txBody>
       </p:sp>
@@ -672,7 +643,7 @@
     </p:spTree>
     <p:extLst>
       <p:ext uri="{BB962C8B-B14F-4D97-AF65-F5344CB8AC3E}">
-        <p14:creationId xmlns:p14="http://schemas.microsoft.com/office/powerpoint/2010/main" val="2269759556"/>
+        <p14:creationId xmlns:p14="http://schemas.microsoft.com/office/powerpoint/2010/main" val="1237583075"/>
       </p:ext>
     </p:extLst>
   </p:cSld>
@@ -728,7 +699,15 @@
           <a:p>
             <a:r>
               <a:rPr lang="en-GB" baseline="0" dirty="0"/>
-              <a:t>Above is my method for calculating the cost. I was unfortunately unable to figure out how to implement it. </a:t>
+              <a:t>As it stands, there is complete CRUD functionality on the Person and </a:t>
+            </a:r>
+            <a:r>
+              <a:rPr lang="en-GB" baseline="0" dirty="0" err="1"/>
+              <a:t>ToDoList</a:t>
+            </a:r>
+            <a:r>
+              <a:rPr lang="en-GB" baseline="0" dirty="0"/>
+              <a:t> classes in my project.</a:t>
             </a:r>
           </a:p>
           <a:p>
@@ -737,7 +716,34 @@
           <a:p>
             <a:r>
               <a:rPr lang="en-GB" baseline="0" dirty="0"/>
-              <a:t>As already stated, due to scope creep and time limitations, I was unable to get the test coverage up to the 80% threshold, only achieving 20%. </a:t>
+              <a:t>All diagrams such as ERDs, UMLs and necessary docs such as risk assessment were completed and included with no issue. </a:t>
+            </a:r>
+          </a:p>
+          <a:p>
+            <a:endParaRPr lang="en-GB" baseline="0" dirty="0"/>
+          </a:p>
+          <a:p>
+            <a:r>
+              <a:rPr lang="en-GB" baseline="0" dirty="0"/>
+              <a:t>All of Continuous Integration was completed this time. Previously, I’d incorrectly installed Maven and needed to edit my system and environment variables in order to get it functioning. </a:t>
+            </a:r>
+          </a:p>
+          <a:p>
+            <a:endParaRPr lang="en-GB" baseline="0" dirty="0"/>
+          </a:p>
+          <a:p>
+            <a:r>
+              <a:rPr lang="en-GB" baseline="0" dirty="0"/>
+              <a:t>All of my back-end testing was completed. Integration testing and the sufficient margin of 80% coverage was achieved. </a:t>
+            </a:r>
+          </a:p>
+          <a:p>
+            <a:endParaRPr lang="en-GB" baseline="0" dirty="0"/>
+          </a:p>
+          <a:p>
+            <a:r>
+              <a:rPr lang="en-GB" baseline="0" dirty="0"/>
+              <a:t>However, my front-end testing was lacking. We’ll move onto that in…</a:t>
             </a:r>
           </a:p>
         </p:txBody>
@@ -768,7 +774,7 @@
     </p:spTree>
     <p:extLst>
       <p:ext uri="{BB962C8B-B14F-4D97-AF65-F5344CB8AC3E}">
-        <p14:creationId xmlns:p14="http://schemas.microsoft.com/office/powerpoint/2010/main" val="559163527"/>
+        <p14:creationId xmlns:p14="http://schemas.microsoft.com/office/powerpoint/2010/main" val="2269759556"/>
       </p:ext>
     </p:extLst>
   </p:cSld>
@@ -824,7 +830,7 @@
           <a:p>
             <a:r>
               <a:rPr lang="en-GB" baseline="0" dirty="0"/>
-              <a:t>Another aspect of the project that had to be abandoned was the .jar build, despite the fact that I ran the commands necessary to create it in normal circumstances. Unfortunately, even after speaking to a colleague and a trainer, I was unable to get it functioning. </a:t>
+              <a:t>As a result of time limitations, I was unable to implement Selenium’s front-end testing. This is something I intend to go over during the Christmas holidays in order to properly comprehend, so that in the future I am able to conduct user-acceptance testing. </a:t>
             </a:r>
           </a:p>
         </p:txBody>
@@ -855,7 +861,7 @@
     </p:spTree>
     <p:extLst>
       <p:ext uri="{BB962C8B-B14F-4D97-AF65-F5344CB8AC3E}">
-        <p14:creationId xmlns:p14="http://schemas.microsoft.com/office/powerpoint/2010/main" val="4143783586"/>
+        <p14:creationId xmlns:p14="http://schemas.microsoft.com/office/powerpoint/2010/main" val="559163527"/>
       </p:ext>
     </p:extLst>
   </p:cSld>
@@ -909,7 +915,10 @@
           <a:bodyPr/>
           <a:lstStyle/>
           <a:p>
-            <a:endParaRPr lang="en-GB" baseline="0" dirty="0"/>
+            <a:r>
+              <a:rPr lang="en-GB" baseline="0" dirty="0"/>
+              <a:t>As a result of time limitations, I was unable to implement SonarQube’s static analysis. This is something I intend to go over during the Christmas holidays in order to properly comprehend, so that in the future I am able to conduct static analysis. </a:t>
+            </a:r>
           </a:p>
         </p:txBody>
       </p:sp>
@@ -939,7 +948,7 @@
     </p:spTree>
     <p:extLst>
       <p:ext uri="{BB962C8B-B14F-4D97-AF65-F5344CB8AC3E}">
-        <p14:creationId xmlns:p14="http://schemas.microsoft.com/office/powerpoint/2010/main" val="2122213585"/>
+        <p14:creationId xmlns:p14="http://schemas.microsoft.com/office/powerpoint/2010/main" val="183070453"/>
       </p:ext>
     </p:extLst>
   </p:cSld>
@@ -1656,15 +1665,7 @@
           <a:p>
             <a:r>
               <a:rPr lang="en-GB" baseline="0" dirty="0"/>
-              <a:t>Something I had not done prior was give the names of features more clear names. For example, feature-</a:t>
-            </a:r>
-            <a:r>
-              <a:rPr lang="en-GB" baseline="0" dirty="0" err="1"/>
-              <a:t>orderitem</a:t>
-            </a:r>
-            <a:r>
-              <a:rPr lang="en-GB" baseline="0" dirty="0"/>
-              <a:t> is much clearer than feature-2. </a:t>
+              <a:t>Something I had not done prior was give the names of features more clear names. </a:t>
             </a:r>
           </a:p>
         </p:txBody>
@@ -1751,7 +1752,7 @@
           <a:p>
             <a:r>
               <a:rPr lang="en-GB" baseline="0" dirty="0"/>
-              <a:t>Testing was the part of the project that caught me out. </a:t>
+              <a:t>Unlike in the previous assignment, I had time to solidify the concepts of unit and integration testing by the time that I approached this project. </a:t>
             </a:r>
           </a:p>
           <a:p>
@@ -1760,7 +1761,7 @@
           <a:p>
             <a:r>
               <a:rPr lang="en-GB" baseline="0" dirty="0"/>
-              <a:t>I had little to not experience with testing, and less time than I had planned to do it as a result of a miscommunication.</a:t>
+              <a:t>It was the aspect of the project that I nonetheless had the least amount of experience with.</a:t>
             </a:r>
           </a:p>
           <a:p>
@@ -1769,15 +1770,7 @@
           <a:p>
             <a:r>
               <a:rPr lang="en-GB" baseline="0" dirty="0"/>
-              <a:t>I had not realised the importance of the IMS starter, and this as a result required additional time to remake the project and transfer my materials into the new file space, refactor appropriately and get acquainted with unforeseen requirements relating to working in the IMS starter, such as adjusting the Utils table and </a:t>
-            </a:r>
-            <a:r>
-              <a:rPr lang="en-GB" baseline="0"/>
-              <a:t>writing both the data &amp; schema </a:t>
-            </a:r>
-            <a:r>
-              <a:rPr lang="en-GB" baseline="0" dirty="0"/>
-              <a:t>for SQL. </a:t>
+              <a:t>However, thanks to having just a little additional time to better understand how the concepts work, we were about to get the testing above the industry standard of 80%. </a:t>
             </a:r>
           </a:p>
         </p:txBody>
@@ -5502,1503 +5495,6 @@
             <p:ph type="title"/>
           </p:nvPr>
         </p:nvSpPr>
-        <p:spPr/>
-        <p:txBody>
-          <a:bodyPr/>
-          <a:lstStyle/>
-          <a:p>
-            <a:r>
-              <a:rPr lang="en-US" dirty="0"/>
-              <a:t>Sprint Review </a:t>
-            </a:r>
-            <a:r>
-              <a:rPr lang="en-US"/>
-              <a:t>– What </a:t>
-            </a:r>
-            <a:r>
-              <a:rPr lang="en-US" dirty="0"/>
-              <a:t>was completed</a:t>
-            </a:r>
-            <a:endParaRPr lang="en-GB" dirty="0"/>
-          </a:p>
-        </p:txBody>
-      </p:sp>
-      <p:sp>
-        <p:nvSpPr>
-          <p:cNvPr id="4" name="Content Placeholder 3">
-            <a:extLst>
-              <a:ext uri="{FF2B5EF4-FFF2-40B4-BE49-F238E27FC236}">
-                <a16:creationId xmlns:a16="http://schemas.microsoft.com/office/drawing/2014/main" id="{8A63D6AF-67C1-4CF6-B7AB-4C171F448D4F}"/>
-              </a:ext>
-            </a:extLst>
-          </p:cNvPr>
-          <p:cNvSpPr>
-            <a:spLocks noGrp="1"/>
-          </p:cNvSpPr>
-          <p:nvPr>
-            <p:ph idx="1"/>
-          </p:nvPr>
-        </p:nvSpPr>
-        <p:spPr>
-          <a:xfrm>
-            <a:off x="3426208" y="750986"/>
-            <a:ext cx="7315200" cy="5120640"/>
-          </a:xfrm>
-        </p:spPr>
-        <p:txBody>
-          <a:bodyPr/>
-          <a:lstStyle/>
-          <a:p>
-            <a:pPr marL="0" indent="0">
-              <a:buNone/>
-            </a:pPr>
-            <a:endParaRPr lang="en-GB" dirty="0"/>
-          </a:p>
-          <a:p>
-            <a:r>
-              <a:rPr lang="en-GB" dirty="0"/>
-              <a:t>All Codebase aspects, save the calculation of the total cost</a:t>
-            </a:r>
-          </a:p>
-          <a:p>
-            <a:endParaRPr lang="en-GB" dirty="0"/>
-          </a:p>
-          <a:p>
-            <a:r>
-              <a:rPr lang="en-GB" dirty="0"/>
-              <a:t>All Repository &amp; Documentation aspects</a:t>
-            </a:r>
-          </a:p>
-          <a:p>
-            <a:endParaRPr lang="en-GB" dirty="0"/>
-          </a:p>
-          <a:p>
-            <a:r>
-              <a:rPr lang="en-GB" dirty="0"/>
-              <a:t>Continuous Integration aspects</a:t>
-            </a:r>
-          </a:p>
-          <a:p>
-            <a:endParaRPr lang="en-GB" dirty="0"/>
-          </a:p>
-          <a:p>
-            <a:endParaRPr lang="en-GB" dirty="0"/>
-          </a:p>
-          <a:p>
-            <a:endParaRPr lang="en-GB" dirty="0"/>
-          </a:p>
-          <a:p>
-            <a:endParaRPr lang="en-GB" dirty="0"/>
-          </a:p>
-        </p:txBody>
-      </p:sp>
-    </p:spTree>
-    <p:extLst>
-      <p:ext uri="{BB962C8B-B14F-4D97-AF65-F5344CB8AC3E}">
-        <p14:creationId xmlns:p14="http://schemas.microsoft.com/office/powerpoint/2010/main" val="1473240061"/>
-      </p:ext>
-    </p:extLst>
-  </p:cSld>
-  <p:clrMapOvr>
-    <a:masterClrMapping/>
-  </p:clrMapOvr>
-</p:sld>
-</file>
-
-<file path=ppt/slides/slide11.xml><?xml version="1.0" encoding="utf-8"?>
-<p:sld xmlns:a="http://schemas.openxmlformats.org/drawingml/2006/main" xmlns:r="http://schemas.openxmlformats.org/officeDocument/2006/relationships" xmlns:p="http://schemas.openxmlformats.org/presentationml/2006/main">
-  <p:cSld>
-    <p:spTree>
-      <p:nvGrpSpPr>
-        <p:cNvPr id="1" name=""/>
-        <p:cNvGrpSpPr/>
-        <p:nvPr/>
-      </p:nvGrpSpPr>
-      <p:grpSpPr>
-        <a:xfrm>
-          <a:off x="0" y="0"/>
-          <a:ext cx="0" cy="0"/>
-          <a:chOff x="0" y="0"/>
-          <a:chExt cx="0" cy="0"/>
-        </a:xfrm>
-      </p:grpSpPr>
-      <p:sp>
-        <p:nvSpPr>
-          <p:cNvPr id="2" name="Title 1"/>
-          <p:cNvSpPr>
-            <a:spLocks noGrp="1"/>
-          </p:cNvSpPr>
-          <p:nvPr>
-            <p:ph type="title"/>
-          </p:nvPr>
-        </p:nvSpPr>
-        <p:spPr/>
-        <p:txBody>
-          <a:bodyPr/>
-          <a:lstStyle/>
-          <a:p>
-            <a:r>
-              <a:rPr lang="en-US" dirty="0"/>
-              <a:t>Sprint Review – What was abandoned</a:t>
-            </a:r>
-            <a:endParaRPr lang="en-GB" dirty="0"/>
-          </a:p>
-        </p:txBody>
-      </p:sp>
-      <p:sp>
-        <p:nvSpPr>
-          <p:cNvPr id="4" name="Content Placeholder 3">
-            <a:extLst>
-              <a:ext uri="{FF2B5EF4-FFF2-40B4-BE49-F238E27FC236}">
-                <a16:creationId xmlns:a16="http://schemas.microsoft.com/office/drawing/2014/main" id="{8A63D6AF-67C1-4CF6-B7AB-4C171F448D4F}"/>
-              </a:ext>
-            </a:extLst>
-          </p:cNvPr>
-          <p:cNvSpPr>
-            <a:spLocks noGrp="1"/>
-          </p:cNvSpPr>
-          <p:nvPr>
-            <p:ph idx="1"/>
-          </p:nvPr>
-        </p:nvSpPr>
-        <p:spPr>
-          <a:xfrm>
-            <a:off x="3426208" y="1665386"/>
-            <a:ext cx="7315200" cy="5120640"/>
-          </a:xfrm>
-        </p:spPr>
-        <p:txBody>
-          <a:bodyPr/>
-          <a:lstStyle/>
-          <a:p>
-            <a:r>
-              <a:rPr lang="en-GB" dirty="0"/>
-              <a:t>The total calculation of a cost</a:t>
-            </a:r>
-          </a:p>
-          <a:p>
-            <a:r>
-              <a:rPr lang="en-GB" dirty="0"/>
-              <a:t>The test coverage 80% </a:t>
-            </a:r>
-            <a:r>
-              <a:rPr lang="en-GB" dirty="0" err="1"/>
-              <a:t>threshhold</a:t>
-            </a:r>
-            <a:endParaRPr lang="en-GB" dirty="0"/>
-          </a:p>
-        </p:txBody>
-      </p:sp>
-      <p:pic>
-        <p:nvPicPr>
-          <p:cNvPr id="3" name="Picture 2">
-            <a:extLst>
-              <a:ext uri="{FF2B5EF4-FFF2-40B4-BE49-F238E27FC236}">
-                <a16:creationId xmlns:a16="http://schemas.microsoft.com/office/drawing/2014/main" id="{07752575-857E-44E8-BA77-7DDB3AD62EC1}"/>
-              </a:ext>
-            </a:extLst>
-          </p:cNvPr>
-          <p:cNvPicPr>
-            <a:picLocks noChangeAspect="1"/>
-          </p:cNvPicPr>
-          <p:nvPr/>
-        </p:nvPicPr>
-        <p:blipFill>
-          <a:blip r:embed="rId3"/>
-          <a:stretch>
-            <a:fillRect/>
-          </a:stretch>
-        </p:blipFill>
-        <p:spPr>
-          <a:xfrm>
-            <a:off x="3559065" y="1123837"/>
-            <a:ext cx="5657505" cy="2553522"/>
-          </a:xfrm>
-          <a:prstGeom prst="rect">
-            <a:avLst/>
-          </a:prstGeom>
-        </p:spPr>
-      </p:pic>
-    </p:spTree>
-    <p:extLst>
-      <p:ext uri="{BB962C8B-B14F-4D97-AF65-F5344CB8AC3E}">
-        <p14:creationId xmlns:p14="http://schemas.microsoft.com/office/powerpoint/2010/main" val="3216747691"/>
-      </p:ext>
-    </p:extLst>
-  </p:cSld>
-  <p:clrMapOvr>
-    <a:masterClrMapping/>
-  </p:clrMapOvr>
-</p:sld>
-</file>
-
-<file path=ppt/slides/slide12.xml><?xml version="1.0" encoding="utf-8"?>
-<p:sld xmlns:a="http://schemas.openxmlformats.org/drawingml/2006/main" xmlns:r="http://schemas.openxmlformats.org/officeDocument/2006/relationships" xmlns:p="http://schemas.openxmlformats.org/presentationml/2006/main">
-  <p:cSld>
-    <p:spTree>
-      <p:nvGrpSpPr>
-        <p:cNvPr id="1" name=""/>
-        <p:cNvGrpSpPr/>
-        <p:nvPr/>
-      </p:nvGrpSpPr>
-      <p:grpSpPr>
-        <a:xfrm>
-          <a:off x="0" y="0"/>
-          <a:ext cx="0" cy="0"/>
-          <a:chOff x="0" y="0"/>
-          <a:chExt cx="0" cy="0"/>
-        </a:xfrm>
-      </p:grpSpPr>
-      <p:sp>
-        <p:nvSpPr>
-          <p:cNvPr id="2" name="Title 1"/>
-          <p:cNvSpPr>
-            <a:spLocks noGrp="1"/>
-          </p:cNvSpPr>
-          <p:nvPr>
-            <p:ph type="title"/>
-          </p:nvPr>
-        </p:nvSpPr>
-        <p:spPr/>
-        <p:txBody>
-          <a:bodyPr/>
-          <a:lstStyle/>
-          <a:p>
-            <a:r>
-              <a:rPr lang="en-US" dirty="0"/>
-              <a:t>Sprint Review – What was abandoned</a:t>
-            </a:r>
-            <a:endParaRPr lang="en-GB" dirty="0"/>
-          </a:p>
-        </p:txBody>
-      </p:sp>
-      <p:sp>
-        <p:nvSpPr>
-          <p:cNvPr id="4" name="Content Placeholder 3">
-            <a:extLst>
-              <a:ext uri="{FF2B5EF4-FFF2-40B4-BE49-F238E27FC236}">
-                <a16:creationId xmlns:a16="http://schemas.microsoft.com/office/drawing/2014/main" id="{8A63D6AF-67C1-4CF6-B7AB-4C171F448D4F}"/>
-              </a:ext>
-            </a:extLst>
-          </p:cNvPr>
-          <p:cNvSpPr>
-            <a:spLocks noGrp="1"/>
-          </p:cNvSpPr>
-          <p:nvPr>
-            <p:ph idx="1"/>
-          </p:nvPr>
-        </p:nvSpPr>
-        <p:spPr>
-          <a:xfrm>
-            <a:off x="3426208" y="4325256"/>
-            <a:ext cx="7315200" cy="2460769"/>
-          </a:xfrm>
-        </p:spPr>
-        <p:txBody>
-          <a:bodyPr/>
-          <a:lstStyle/>
-          <a:p>
-            <a:r>
-              <a:rPr lang="en-GB" dirty="0"/>
-              <a:t>The .jar build of the project</a:t>
-            </a:r>
-          </a:p>
-        </p:txBody>
-      </p:sp>
-      <p:pic>
-        <p:nvPicPr>
-          <p:cNvPr id="5" name="Picture 4">
-            <a:extLst>
-              <a:ext uri="{FF2B5EF4-FFF2-40B4-BE49-F238E27FC236}">
-                <a16:creationId xmlns:a16="http://schemas.microsoft.com/office/drawing/2014/main" id="{49A2D029-1A29-4C14-A14E-3A444643FD1E}"/>
-              </a:ext>
-            </a:extLst>
-          </p:cNvPr>
-          <p:cNvPicPr>
-            <a:picLocks noChangeAspect="1"/>
-          </p:cNvPicPr>
-          <p:nvPr/>
-        </p:nvPicPr>
-        <p:blipFill>
-          <a:blip r:embed="rId3"/>
-          <a:stretch>
-            <a:fillRect/>
-          </a:stretch>
-        </p:blipFill>
-        <p:spPr>
-          <a:xfrm>
-            <a:off x="3494743" y="818244"/>
-            <a:ext cx="8697257" cy="3429000"/>
-          </a:xfrm>
-          <a:prstGeom prst="rect">
-            <a:avLst/>
-          </a:prstGeom>
-        </p:spPr>
-      </p:pic>
-    </p:spTree>
-    <p:extLst>
-      <p:ext uri="{BB962C8B-B14F-4D97-AF65-F5344CB8AC3E}">
-        <p14:creationId xmlns:p14="http://schemas.microsoft.com/office/powerpoint/2010/main" val="1578017091"/>
-      </p:ext>
-    </p:extLst>
-  </p:cSld>
-  <p:clrMapOvr>
-    <a:masterClrMapping/>
-  </p:clrMapOvr>
-</p:sld>
-</file>
-
-<file path=ppt/slides/slide13.xml><?xml version="1.0" encoding="utf-8"?>
-<p:sld xmlns:a="http://schemas.openxmlformats.org/drawingml/2006/main" xmlns:r="http://schemas.openxmlformats.org/officeDocument/2006/relationships" xmlns:p="http://schemas.openxmlformats.org/presentationml/2006/main">
-  <p:cSld>
-    <p:spTree>
-      <p:nvGrpSpPr>
-        <p:cNvPr id="1" name=""/>
-        <p:cNvGrpSpPr/>
-        <p:nvPr/>
-      </p:nvGrpSpPr>
-      <p:grpSpPr>
-        <a:xfrm>
-          <a:off x="0" y="0"/>
-          <a:ext cx="0" cy="0"/>
-          <a:chOff x="0" y="0"/>
-          <a:chExt cx="0" cy="0"/>
-        </a:xfrm>
-      </p:grpSpPr>
-      <p:sp>
-        <p:nvSpPr>
-          <p:cNvPr id="2" name="Title 1"/>
-          <p:cNvSpPr>
-            <a:spLocks noGrp="1"/>
-          </p:cNvSpPr>
-          <p:nvPr>
-            <p:ph type="title"/>
-          </p:nvPr>
-        </p:nvSpPr>
-        <p:spPr/>
-        <p:txBody>
-          <a:bodyPr/>
-          <a:lstStyle/>
-          <a:p>
-            <a:r>
-              <a:rPr lang="en-US" dirty="0"/>
-              <a:t>Sprint Review – What was abandoned</a:t>
-            </a:r>
-            <a:endParaRPr lang="en-GB" dirty="0"/>
-          </a:p>
-        </p:txBody>
-      </p:sp>
-      <p:sp>
-        <p:nvSpPr>
-          <p:cNvPr id="4" name="Content Placeholder 3">
-            <a:extLst>
-              <a:ext uri="{FF2B5EF4-FFF2-40B4-BE49-F238E27FC236}">
-                <a16:creationId xmlns:a16="http://schemas.microsoft.com/office/drawing/2014/main" id="{8A63D6AF-67C1-4CF6-B7AB-4C171F448D4F}"/>
-              </a:ext>
-            </a:extLst>
-          </p:cNvPr>
-          <p:cNvSpPr>
-            <a:spLocks noGrp="1"/>
-          </p:cNvSpPr>
-          <p:nvPr>
-            <p:ph idx="1"/>
-          </p:nvPr>
-        </p:nvSpPr>
-        <p:spPr>
-          <a:xfrm>
-            <a:off x="3426208" y="4325256"/>
-            <a:ext cx="7315200" cy="2460769"/>
-          </a:xfrm>
-        </p:spPr>
-        <p:txBody>
-          <a:bodyPr/>
-          <a:lstStyle/>
-          <a:p>
-            <a:r>
-              <a:rPr lang="en-GB" dirty="0"/>
-              <a:t>Despite containing the correct pom.xml material…</a:t>
-            </a:r>
-          </a:p>
-        </p:txBody>
-      </p:sp>
-      <p:pic>
-        <p:nvPicPr>
-          <p:cNvPr id="6" name="Picture 5">
-            <a:extLst>
-              <a:ext uri="{FF2B5EF4-FFF2-40B4-BE49-F238E27FC236}">
-                <a16:creationId xmlns:a16="http://schemas.microsoft.com/office/drawing/2014/main" id="{B277C2DC-6C09-49E5-92CB-8C12234EDA75}"/>
-              </a:ext>
-            </a:extLst>
-          </p:cNvPr>
-          <p:cNvPicPr>
-            <a:picLocks noChangeAspect="1"/>
-          </p:cNvPicPr>
-          <p:nvPr/>
-        </p:nvPicPr>
-        <p:blipFill>
-          <a:blip r:embed="rId3"/>
-          <a:stretch>
-            <a:fillRect/>
-          </a:stretch>
-        </p:blipFill>
-        <p:spPr>
-          <a:xfrm>
-            <a:off x="3426208" y="1943971"/>
-            <a:ext cx="6581047" cy="3228308"/>
-          </a:xfrm>
-          <a:prstGeom prst="rect">
-            <a:avLst/>
-          </a:prstGeom>
-        </p:spPr>
-      </p:pic>
-      <p:pic>
-        <p:nvPicPr>
-          <p:cNvPr id="3" name="Picture 2">
-            <a:extLst>
-              <a:ext uri="{FF2B5EF4-FFF2-40B4-BE49-F238E27FC236}">
-                <a16:creationId xmlns:a16="http://schemas.microsoft.com/office/drawing/2014/main" id="{C5914AE1-F253-4303-86AE-6F46BA4C1CBC}"/>
-              </a:ext>
-            </a:extLst>
-          </p:cNvPr>
-          <p:cNvPicPr>
-            <a:picLocks noChangeAspect="1"/>
-          </p:cNvPicPr>
-          <p:nvPr/>
-        </p:nvPicPr>
-        <p:blipFill>
-          <a:blip r:embed="rId4"/>
-          <a:stretch>
-            <a:fillRect/>
-          </a:stretch>
-        </p:blipFill>
-        <p:spPr>
-          <a:xfrm>
-            <a:off x="3426208" y="1094807"/>
-            <a:ext cx="3915321" cy="905001"/>
-          </a:xfrm>
-          <a:prstGeom prst="rect">
-            <a:avLst/>
-          </a:prstGeom>
-        </p:spPr>
-      </p:pic>
-    </p:spTree>
-    <p:extLst>
-      <p:ext uri="{BB962C8B-B14F-4D97-AF65-F5344CB8AC3E}">
-        <p14:creationId xmlns:p14="http://schemas.microsoft.com/office/powerpoint/2010/main" val="226645177"/>
-      </p:ext>
-    </p:extLst>
-  </p:cSld>
-  <p:clrMapOvr>
-    <a:masterClrMapping/>
-  </p:clrMapOvr>
-</p:sld>
-</file>
-
-<file path=ppt/slides/slide14.xml><?xml version="1.0" encoding="utf-8"?>
-<p:sld xmlns:a="http://schemas.openxmlformats.org/drawingml/2006/main" xmlns:r="http://schemas.openxmlformats.org/officeDocument/2006/relationships" xmlns:p="http://schemas.openxmlformats.org/presentationml/2006/main">
-  <p:cSld>
-    <p:spTree>
-      <p:nvGrpSpPr>
-        <p:cNvPr id="1" name=""/>
-        <p:cNvGrpSpPr/>
-        <p:nvPr/>
-      </p:nvGrpSpPr>
-      <p:grpSpPr>
-        <a:xfrm>
-          <a:off x="0" y="0"/>
-          <a:ext cx="0" cy="0"/>
-          <a:chOff x="0" y="0"/>
-          <a:chExt cx="0" cy="0"/>
-        </a:xfrm>
-      </p:grpSpPr>
-      <p:sp>
-        <p:nvSpPr>
-          <p:cNvPr id="2" name="Title 1"/>
-          <p:cNvSpPr>
-            <a:spLocks noGrp="1"/>
-          </p:cNvSpPr>
-          <p:nvPr>
-            <p:ph type="title"/>
-          </p:nvPr>
-        </p:nvSpPr>
-        <p:spPr/>
-        <p:txBody>
-          <a:bodyPr/>
-          <a:lstStyle/>
-          <a:p>
-            <a:r>
-              <a:rPr lang="en-GB" dirty="0"/>
-              <a:t>Sprint retrospective – what went well</a:t>
-            </a:r>
-          </a:p>
-        </p:txBody>
-      </p:sp>
-      <p:sp>
-        <p:nvSpPr>
-          <p:cNvPr id="5" name="Content Placeholder 4">
-            <a:extLst>
-              <a:ext uri="{FF2B5EF4-FFF2-40B4-BE49-F238E27FC236}">
-                <a16:creationId xmlns:a16="http://schemas.microsoft.com/office/drawing/2014/main" id="{7CB021C8-966B-4156-8C1C-1686E36B0B64}"/>
-              </a:ext>
-            </a:extLst>
-          </p:cNvPr>
-          <p:cNvSpPr>
-            <a:spLocks noGrp="1"/>
-          </p:cNvSpPr>
-          <p:nvPr>
-            <p:ph idx="1"/>
-          </p:nvPr>
-        </p:nvSpPr>
-        <p:spPr/>
-        <p:txBody>
-          <a:bodyPr/>
-          <a:lstStyle/>
-          <a:p>
-            <a:r>
-              <a:rPr lang="en-GB" dirty="0"/>
-              <a:t>MySQL </a:t>
-            </a:r>
-          </a:p>
-          <a:p>
-            <a:r>
-              <a:rPr lang="en-GB" dirty="0"/>
-              <a:t>Java</a:t>
-            </a:r>
-          </a:p>
-          <a:p>
-            <a:r>
-              <a:rPr lang="en-GB" dirty="0"/>
-              <a:t>Git</a:t>
-            </a:r>
-          </a:p>
-          <a:p>
-            <a:r>
-              <a:rPr lang="en-GB" dirty="0"/>
-              <a:t>GitHub</a:t>
-            </a:r>
-          </a:p>
-          <a:p>
-            <a:endParaRPr lang="en-GB" dirty="0"/>
-          </a:p>
-        </p:txBody>
-      </p:sp>
-    </p:spTree>
-    <p:extLst>
-      <p:ext uri="{BB962C8B-B14F-4D97-AF65-F5344CB8AC3E}">
-        <p14:creationId xmlns:p14="http://schemas.microsoft.com/office/powerpoint/2010/main" val="3941797447"/>
-      </p:ext>
-    </p:extLst>
-  </p:cSld>
-  <p:clrMapOvr>
-    <a:masterClrMapping/>
-  </p:clrMapOvr>
-</p:sld>
-</file>
-
-<file path=ppt/slides/slide15.xml><?xml version="1.0" encoding="utf-8"?>
-<p:sld xmlns:a="http://schemas.openxmlformats.org/drawingml/2006/main" xmlns:r="http://schemas.openxmlformats.org/officeDocument/2006/relationships" xmlns:p="http://schemas.openxmlformats.org/presentationml/2006/main">
-  <p:cSld>
-    <p:spTree>
-      <p:nvGrpSpPr>
-        <p:cNvPr id="1" name=""/>
-        <p:cNvGrpSpPr/>
-        <p:nvPr/>
-      </p:nvGrpSpPr>
-      <p:grpSpPr>
-        <a:xfrm>
-          <a:off x="0" y="0"/>
-          <a:ext cx="0" cy="0"/>
-          <a:chOff x="0" y="0"/>
-          <a:chExt cx="0" cy="0"/>
-        </a:xfrm>
-      </p:grpSpPr>
-      <p:sp>
-        <p:nvSpPr>
-          <p:cNvPr id="2" name="Title 1"/>
-          <p:cNvSpPr>
-            <a:spLocks noGrp="1"/>
-          </p:cNvSpPr>
-          <p:nvPr>
-            <p:ph type="title"/>
-          </p:nvPr>
-        </p:nvSpPr>
-        <p:spPr/>
-        <p:txBody>
-          <a:bodyPr/>
-          <a:lstStyle/>
-          <a:p>
-            <a:r>
-              <a:rPr lang="en-US" dirty="0"/>
-              <a:t>Sprint retrospective – what could have been done better</a:t>
-            </a:r>
-            <a:endParaRPr lang="en-GB" dirty="0"/>
-          </a:p>
-        </p:txBody>
-      </p:sp>
-      <p:sp>
-        <p:nvSpPr>
-          <p:cNvPr id="3" name="Content Placeholder 2"/>
-          <p:cNvSpPr>
-            <a:spLocks noGrp="1"/>
-          </p:cNvSpPr>
-          <p:nvPr>
-            <p:ph idx="1"/>
-          </p:nvPr>
-        </p:nvSpPr>
-        <p:spPr>
-          <a:xfrm>
-            <a:off x="3445212" y="1583955"/>
-            <a:ext cx="7315200" cy="5120640"/>
-          </a:xfrm>
-        </p:spPr>
-        <p:txBody>
-          <a:bodyPr>
-            <a:normAutofit/>
-          </a:bodyPr>
-          <a:lstStyle/>
-          <a:p>
-            <a:r>
-              <a:rPr lang="en-GB" sz="3200" baseline="30000" dirty="0"/>
-              <a:t>Junit</a:t>
-            </a:r>
-          </a:p>
-          <a:p>
-            <a:r>
-              <a:rPr lang="en-GB" sz="3200" baseline="30000" dirty="0"/>
-              <a:t>Maven</a:t>
-            </a:r>
-          </a:p>
-          <a:p>
-            <a:r>
-              <a:rPr lang="en-GB" sz="3200" baseline="30000" dirty="0"/>
-              <a:t>Jira</a:t>
-            </a:r>
-          </a:p>
-        </p:txBody>
-      </p:sp>
-    </p:spTree>
-    <p:extLst>
-      <p:ext uri="{BB962C8B-B14F-4D97-AF65-F5344CB8AC3E}">
-        <p14:creationId xmlns:p14="http://schemas.microsoft.com/office/powerpoint/2010/main" val="2743704402"/>
-      </p:ext>
-    </p:extLst>
-  </p:cSld>
-  <p:clrMapOvr>
-    <a:masterClrMapping/>
-  </p:clrMapOvr>
-</p:sld>
-</file>
-
-<file path=ppt/slides/slide16.xml><?xml version="1.0" encoding="utf-8"?>
-<p:sld xmlns:a="http://schemas.openxmlformats.org/drawingml/2006/main" xmlns:r="http://schemas.openxmlformats.org/officeDocument/2006/relationships" xmlns:p="http://schemas.openxmlformats.org/presentationml/2006/main">
-  <p:cSld>
-    <p:spTree>
-      <p:nvGrpSpPr>
-        <p:cNvPr id="1" name=""/>
-        <p:cNvGrpSpPr/>
-        <p:nvPr/>
-      </p:nvGrpSpPr>
-      <p:grpSpPr>
-        <a:xfrm>
-          <a:off x="0" y="0"/>
-          <a:ext cx="0" cy="0"/>
-          <a:chOff x="0" y="0"/>
-          <a:chExt cx="0" cy="0"/>
-        </a:xfrm>
-      </p:grpSpPr>
-      <p:sp>
-        <p:nvSpPr>
-          <p:cNvPr id="2" name="Title 1"/>
-          <p:cNvSpPr>
-            <a:spLocks noGrp="1"/>
-          </p:cNvSpPr>
-          <p:nvPr>
-            <p:ph type="title"/>
-          </p:nvPr>
-        </p:nvSpPr>
-        <p:spPr/>
-        <p:txBody>
-          <a:bodyPr/>
-          <a:lstStyle/>
-          <a:p>
-            <a:r>
-              <a:rPr lang="en-GB" dirty="0"/>
-              <a:t>Conclusions drawn</a:t>
-            </a:r>
-          </a:p>
-        </p:txBody>
-      </p:sp>
-      <p:sp>
-        <p:nvSpPr>
-          <p:cNvPr id="5" name="Content Placeholder 4">
-            <a:extLst>
-              <a:ext uri="{FF2B5EF4-FFF2-40B4-BE49-F238E27FC236}">
-                <a16:creationId xmlns:a16="http://schemas.microsoft.com/office/drawing/2014/main" id="{DB369E6E-40BA-416C-8274-4141D9EDA165}"/>
-              </a:ext>
-            </a:extLst>
-          </p:cNvPr>
-          <p:cNvSpPr>
-            <a:spLocks noGrp="1"/>
-          </p:cNvSpPr>
-          <p:nvPr>
-            <p:ph idx="1"/>
-          </p:nvPr>
-        </p:nvSpPr>
-        <p:spPr/>
-        <p:txBody>
-          <a:bodyPr/>
-          <a:lstStyle/>
-          <a:p>
-            <a:pPr marL="0" indent="0">
-              <a:buNone/>
-            </a:pPr>
-            <a:endParaRPr lang="en-GB" dirty="0"/>
-          </a:p>
-          <a:p>
-            <a:r>
-              <a:rPr lang="en-GB" b="1" dirty="0"/>
-              <a:t>1. Time allocation is key</a:t>
-            </a:r>
-          </a:p>
-          <a:p>
-            <a:endParaRPr lang="en-GB" b="1" dirty="0"/>
-          </a:p>
-          <a:p>
-            <a:r>
-              <a:rPr lang="en-GB" b="1" dirty="0"/>
-              <a:t>2.  Knowledge of Java, GitHub, Git &amp; SQL currently meets or is close to meeting expected standards</a:t>
-            </a:r>
-          </a:p>
-          <a:p>
-            <a:endParaRPr lang="en-GB" b="1" dirty="0"/>
-          </a:p>
-          <a:p>
-            <a:r>
-              <a:rPr lang="en-GB" b="1" dirty="0"/>
-              <a:t>3.  Additional JUnit practising will need to be conducted in spare time</a:t>
-            </a:r>
-          </a:p>
-          <a:p>
-            <a:endParaRPr lang="en-GB" b="1" dirty="0"/>
-          </a:p>
-          <a:p>
-            <a:r>
-              <a:rPr lang="en-GB" b="1" dirty="0"/>
-              <a:t>4.  Scope creep was biggest reason for project shortcomings</a:t>
-            </a:r>
-          </a:p>
-          <a:p>
-            <a:endParaRPr lang="en-GB" dirty="0"/>
-          </a:p>
-        </p:txBody>
-      </p:sp>
-    </p:spTree>
-    <p:extLst>
-      <p:ext uri="{BB962C8B-B14F-4D97-AF65-F5344CB8AC3E}">
-        <p14:creationId xmlns:p14="http://schemas.microsoft.com/office/powerpoint/2010/main" val="3423769046"/>
-      </p:ext>
-    </p:extLst>
-  </p:cSld>
-  <p:clrMapOvr>
-    <a:masterClrMapping/>
-  </p:clrMapOvr>
-</p:sld>
-</file>
-
-<file path=ppt/slides/slide17.xml><?xml version="1.0" encoding="utf-8"?>
-<p:sld xmlns:a="http://schemas.openxmlformats.org/drawingml/2006/main" xmlns:r="http://schemas.openxmlformats.org/officeDocument/2006/relationships" xmlns:p="http://schemas.openxmlformats.org/presentationml/2006/main">
-  <p:cSld>
-    <p:spTree>
-      <p:nvGrpSpPr>
-        <p:cNvPr id="1" name=""/>
-        <p:cNvGrpSpPr/>
-        <p:nvPr/>
-      </p:nvGrpSpPr>
-      <p:grpSpPr>
-        <a:xfrm>
-          <a:off x="0" y="0"/>
-          <a:ext cx="0" cy="0"/>
-          <a:chOff x="0" y="0"/>
-          <a:chExt cx="0" cy="0"/>
-        </a:xfrm>
-      </p:grpSpPr>
-      <p:sp>
-        <p:nvSpPr>
-          <p:cNvPr id="2" name="Title 1"/>
-          <p:cNvSpPr>
-            <a:spLocks noGrp="1"/>
-          </p:cNvSpPr>
-          <p:nvPr>
-            <p:ph type="title"/>
-          </p:nvPr>
-        </p:nvSpPr>
-        <p:spPr/>
-        <p:txBody>
-          <a:bodyPr/>
-          <a:lstStyle/>
-          <a:p>
-            <a:r>
-              <a:rPr lang="en-GB" dirty="0"/>
-              <a:t>Conclusion</a:t>
-            </a:r>
-          </a:p>
-        </p:txBody>
-      </p:sp>
-      <p:sp>
-        <p:nvSpPr>
-          <p:cNvPr id="5" name="Content Placeholder 4">
-            <a:extLst>
-              <a:ext uri="{FF2B5EF4-FFF2-40B4-BE49-F238E27FC236}">
-                <a16:creationId xmlns:a16="http://schemas.microsoft.com/office/drawing/2014/main" id="{DB369E6E-40BA-416C-8274-4141D9EDA165}"/>
-              </a:ext>
-            </a:extLst>
-          </p:cNvPr>
-          <p:cNvSpPr>
-            <a:spLocks noGrp="1"/>
-          </p:cNvSpPr>
-          <p:nvPr>
-            <p:ph idx="1"/>
-          </p:nvPr>
-        </p:nvSpPr>
-        <p:spPr/>
-        <p:txBody>
-          <a:bodyPr/>
-          <a:lstStyle/>
-          <a:p>
-            <a:r>
-              <a:rPr lang="en-GB" b="1" dirty="0"/>
-              <a:t>Thank you for listening!</a:t>
-            </a:r>
-          </a:p>
-          <a:p>
-            <a:endParaRPr lang="en-GB" b="1" dirty="0"/>
-          </a:p>
-          <a:p>
-            <a:r>
-              <a:rPr lang="en-GB" b="1" dirty="0"/>
-              <a:t>Are there any questions?</a:t>
-            </a:r>
-          </a:p>
-        </p:txBody>
-      </p:sp>
-    </p:spTree>
-    <p:extLst>
-      <p:ext uri="{BB962C8B-B14F-4D97-AF65-F5344CB8AC3E}">
-        <p14:creationId xmlns:p14="http://schemas.microsoft.com/office/powerpoint/2010/main" val="4212480872"/>
-      </p:ext>
-    </p:extLst>
-  </p:cSld>
-  <p:clrMapOvr>
-    <a:masterClrMapping/>
-  </p:clrMapOvr>
-</p:sld>
-</file>
-
-<file path=ppt/slides/slide2.xml><?xml version="1.0" encoding="utf-8"?>
-<p:sld xmlns:a="http://schemas.openxmlformats.org/drawingml/2006/main" xmlns:r="http://schemas.openxmlformats.org/officeDocument/2006/relationships" xmlns:p="http://schemas.openxmlformats.org/presentationml/2006/main">
-  <p:cSld>
-    <p:spTree>
-      <p:nvGrpSpPr>
-        <p:cNvPr id="1" name=""/>
-        <p:cNvGrpSpPr/>
-        <p:nvPr/>
-      </p:nvGrpSpPr>
-      <p:grpSpPr>
-        <a:xfrm>
-          <a:off x="0" y="0"/>
-          <a:ext cx="0" cy="0"/>
-          <a:chOff x="0" y="0"/>
-          <a:chExt cx="0" cy="0"/>
-        </a:xfrm>
-      </p:grpSpPr>
-      <p:sp>
-        <p:nvSpPr>
-          <p:cNvPr id="2" name="Title 1"/>
-          <p:cNvSpPr>
-            <a:spLocks noGrp="1"/>
-          </p:cNvSpPr>
-          <p:nvPr>
-            <p:ph type="title"/>
-          </p:nvPr>
-        </p:nvSpPr>
-        <p:spPr/>
-        <p:txBody>
-          <a:bodyPr/>
-          <a:lstStyle/>
-          <a:p>
-            <a:r>
-              <a:rPr lang="en-GB" dirty="0"/>
-              <a:t>Introduction</a:t>
-            </a:r>
-          </a:p>
-        </p:txBody>
-      </p:sp>
-      <p:sp>
-        <p:nvSpPr>
-          <p:cNvPr id="3" name="Content Placeholder 2"/>
-          <p:cNvSpPr>
-            <a:spLocks noGrp="1"/>
-          </p:cNvSpPr>
-          <p:nvPr>
-            <p:ph idx="1"/>
-          </p:nvPr>
-        </p:nvSpPr>
-        <p:spPr>
-          <a:xfrm>
-            <a:off x="3445212" y="1583955"/>
-            <a:ext cx="7315200" cy="5120640"/>
-          </a:xfrm>
-        </p:spPr>
-        <p:txBody>
-          <a:bodyPr>
-            <a:normAutofit/>
-          </a:bodyPr>
-          <a:lstStyle/>
-          <a:p>
-            <a:r>
-              <a:rPr lang="en-GB" sz="2400" dirty="0"/>
-              <a:t>Hello! </a:t>
-            </a:r>
-          </a:p>
-          <a:p>
-            <a:endParaRPr lang="en-GB" sz="2400" dirty="0"/>
-          </a:p>
-          <a:p>
-            <a:r>
-              <a:rPr lang="en-GB" sz="2400" dirty="0"/>
-              <a:t>BSc Grad. Applied Computing</a:t>
-            </a:r>
-          </a:p>
-          <a:p>
-            <a:pPr marL="0" indent="0">
-              <a:buNone/>
-            </a:pPr>
-            <a:endParaRPr lang="en-GB" sz="2400" dirty="0"/>
-          </a:p>
-          <a:p>
-            <a:r>
-              <a:rPr lang="en-GB" sz="2400" dirty="0"/>
-              <a:t>Through focusing on the requirements </a:t>
-            </a:r>
-          </a:p>
-          <a:p>
-            <a:pPr marL="0" indent="0">
-              <a:buNone/>
-            </a:pPr>
-            <a:r>
-              <a:rPr lang="en-GB" sz="2400" dirty="0"/>
-              <a:t> </a:t>
-            </a:r>
-            <a:endParaRPr lang="en-GB" sz="2400" baseline="30000" dirty="0"/>
-          </a:p>
-        </p:txBody>
-      </p:sp>
-    </p:spTree>
-    <p:extLst>
-      <p:ext uri="{BB962C8B-B14F-4D97-AF65-F5344CB8AC3E}">
-        <p14:creationId xmlns:p14="http://schemas.microsoft.com/office/powerpoint/2010/main" val="1292386870"/>
-      </p:ext>
-    </p:extLst>
-  </p:cSld>
-  <p:clrMapOvr>
-    <a:masterClrMapping/>
-  </p:clrMapOvr>
-</p:sld>
-</file>
-
-<file path=ppt/slides/slide3.xml><?xml version="1.0" encoding="utf-8"?>
-<p:sld xmlns:a="http://schemas.openxmlformats.org/drawingml/2006/main" xmlns:r="http://schemas.openxmlformats.org/officeDocument/2006/relationships" xmlns:p="http://schemas.openxmlformats.org/presentationml/2006/main">
-  <p:cSld>
-    <p:spTree>
-      <p:nvGrpSpPr>
-        <p:cNvPr id="1" name=""/>
-        <p:cNvGrpSpPr/>
-        <p:nvPr/>
-      </p:nvGrpSpPr>
-      <p:grpSpPr>
-        <a:xfrm>
-          <a:off x="0" y="0"/>
-          <a:ext cx="0" cy="0"/>
-          <a:chOff x="0" y="0"/>
-          <a:chExt cx="0" cy="0"/>
-        </a:xfrm>
-      </p:grpSpPr>
-      <p:sp>
-        <p:nvSpPr>
-          <p:cNvPr id="2" name="Title 1"/>
-          <p:cNvSpPr>
-            <a:spLocks noGrp="1"/>
-          </p:cNvSpPr>
-          <p:nvPr>
-            <p:ph type="title"/>
-          </p:nvPr>
-        </p:nvSpPr>
-        <p:spPr/>
-        <p:txBody>
-          <a:bodyPr/>
-          <a:lstStyle/>
-          <a:p>
-            <a:r>
-              <a:rPr lang="en-GB" dirty="0"/>
-              <a:t>Consultant Journey</a:t>
-            </a:r>
-          </a:p>
-        </p:txBody>
-      </p:sp>
-      <p:sp>
-        <p:nvSpPr>
-          <p:cNvPr id="3" name="Content Placeholder 2"/>
-          <p:cNvSpPr>
-            <a:spLocks noGrp="1"/>
-          </p:cNvSpPr>
-          <p:nvPr>
-            <p:ph idx="1"/>
-          </p:nvPr>
-        </p:nvSpPr>
-        <p:spPr>
-          <a:xfrm>
-            <a:off x="3445212" y="1583955"/>
-            <a:ext cx="7315200" cy="5120640"/>
-          </a:xfrm>
-        </p:spPr>
-        <p:txBody>
-          <a:bodyPr>
-            <a:normAutofit/>
-          </a:bodyPr>
-          <a:lstStyle/>
-          <a:p>
-            <a:r>
-              <a:rPr lang="en-GB" dirty="0"/>
-              <a:t>Technologies I was already familiar with: Java, SQL, HTML &amp; CSS</a:t>
-            </a:r>
-          </a:p>
-          <a:p>
-            <a:endParaRPr lang="en-GB" dirty="0"/>
-          </a:p>
-          <a:p>
-            <a:r>
-              <a:rPr lang="en-GB" dirty="0"/>
-              <a:t>Technologies I’d used but not mastered: Git, GitHub, JavaScript, Jira, Maven, JUnit</a:t>
-            </a:r>
-          </a:p>
-          <a:p>
-            <a:endParaRPr lang="en-GB" dirty="0"/>
-          </a:p>
-          <a:p>
-            <a:r>
-              <a:rPr lang="en-GB" dirty="0"/>
-              <a:t>Technologies I’d never used before: Spring, SonarQube, Selenium</a:t>
-            </a:r>
-          </a:p>
-          <a:p>
-            <a:endParaRPr lang="en-US" dirty="0"/>
-          </a:p>
-          <a:p>
-            <a:pPr marL="0" indent="0">
-              <a:buNone/>
-            </a:pPr>
-            <a:endParaRPr lang="en-GB" sz="2400" baseline="30000" dirty="0"/>
-          </a:p>
-        </p:txBody>
-      </p:sp>
-    </p:spTree>
-    <p:extLst>
-      <p:ext uri="{BB962C8B-B14F-4D97-AF65-F5344CB8AC3E}">
-        <p14:creationId xmlns:p14="http://schemas.microsoft.com/office/powerpoint/2010/main" val="184584019"/>
-      </p:ext>
-    </p:extLst>
-  </p:cSld>
-  <p:clrMapOvr>
-    <a:masterClrMapping/>
-  </p:clrMapOvr>
-</p:sld>
-</file>
-
-<file path=ppt/slides/slide4.xml><?xml version="1.0" encoding="utf-8"?>
-<p:sld xmlns:a="http://schemas.openxmlformats.org/drawingml/2006/main" xmlns:r="http://schemas.openxmlformats.org/officeDocument/2006/relationships" xmlns:p="http://schemas.openxmlformats.org/presentationml/2006/main">
-  <p:cSld>
-    <p:spTree>
-      <p:nvGrpSpPr>
-        <p:cNvPr id="1" name=""/>
-        <p:cNvGrpSpPr/>
-        <p:nvPr/>
-      </p:nvGrpSpPr>
-      <p:grpSpPr>
-        <a:xfrm>
-          <a:off x="0" y="0"/>
-          <a:ext cx="0" cy="0"/>
-          <a:chOff x="0" y="0"/>
-          <a:chExt cx="0" cy="0"/>
-        </a:xfrm>
-      </p:grpSpPr>
-      <p:sp>
-        <p:nvSpPr>
-          <p:cNvPr id="2" name="Title 1"/>
-          <p:cNvSpPr>
-            <a:spLocks noGrp="1"/>
-          </p:cNvSpPr>
-          <p:nvPr>
-            <p:ph type="title"/>
-          </p:nvPr>
-        </p:nvSpPr>
-        <p:spPr/>
-        <p:txBody>
-          <a:bodyPr/>
-          <a:lstStyle/>
-          <a:p>
-            <a:r>
-              <a:rPr lang="en-GB" dirty="0"/>
-              <a:t>Continuous Integration (CI)</a:t>
-            </a:r>
-          </a:p>
-        </p:txBody>
-      </p:sp>
-      <p:sp>
-        <p:nvSpPr>
-          <p:cNvPr id="5" name="Content Placeholder 4">
-            <a:extLst>
-              <a:ext uri="{FF2B5EF4-FFF2-40B4-BE49-F238E27FC236}">
-                <a16:creationId xmlns:a16="http://schemas.microsoft.com/office/drawing/2014/main" id="{E69B6396-C133-4371-A324-35DED18C6D3B}"/>
-              </a:ext>
-            </a:extLst>
-          </p:cNvPr>
-          <p:cNvSpPr>
-            <a:spLocks noGrp="1"/>
-          </p:cNvSpPr>
-          <p:nvPr>
-            <p:ph idx="1"/>
-          </p:nvPr>
-        </p:nvSpPr>
-        <p:spPr>
-          <a:xfrm>
-            <a:off x="3869268" y="324089"/>
-            <a:ext cx="7315200" cy="2234551"/>
-          </a:xfrm>
-        </p:spPr>
-        <p:txBody>
-          <a:bodyPr/>
-          <a:lstStyle/>
-          <a:p>
-            <a:r>
-              <a:rPr lang="en-GB" dirty="0"/>
-              <a:t>Version control was approached with industry standards in mind</a:t>
-            </a:r>
-          </a:p>
-        </p:txBody>
-      </p:sp>
-      <p:pic>
-        <p:nvPicPr>
-          <p:cNvPr id="3" name="Picture 2">
-            <a:extLst>
-              <a:ext uri="{FF2B5EF4-FFF2-40B4-BE49-F238E27FC236}">
-                <a16:creationId xmlns:a16="http://schemas.microsoft.com/office/drawing/2014/main" id="{BD406D58-6096-44D0-BFD1-CE0EADC459EA}"/>
-              </a:ext>
-            </a:extLst>
-          </p:cNvPr>
-          <p:cNvPicPr>
-            <a:picLocks noChangeAspect="1"/>
-          </p:cNvPicPr>
-          <p:nvPr/>
-        </p:nvPicPr>
-        <p:blipFill>
-          <a:blip r:embed="rId3"/>
-          <a:stretch>
-            <a:fillRect/>
-          </a:stretch>
-        </p:blipFill>
-        <p:spPr>
-          <a:xfrm>
-            <a:off x="3684607" y="1688056"/>
-            <a:ext cx="7315200" cy="3727386"/>
-          </a:xfrm>
-          <a:prstGeom prst="rect">
-            <a:avLst/>
-          </a:prstGeom>
-        </p:spPr>
-      </p:pic>
-    </p:spTree>
-    <p:extLst>
-      <p:ext uri="{BB962C8B-B14F-4D97-AF65-F5344CB8AC3E}">
-        <p14:creationId xmlns:p14="http://schemas.microsoft.com/office/powerpoint/2010/main" val="3196788493"/>
-      </p:ext>
-    </p:extLst>
-  </p:cSld>
-  <p:clrMapOvr>
-    <a:masterClrMapping/>
-  </p:clrMapOvr>
-</p:sld>
-</file>
-
-<file path=ppt/slides/slide5.xml><?xml version="1.0" encoding="utf-8"?>
-<p:sld xmlns:a="http://schemas.openxmlformats.org/drawingml/2006/main" xmlns:r="http://schemas.openxmlformats.org/officeDocument/2006/relationships" xmlns:p="http://schemas.openxmlformats.org/presentationml/2006/main">
-  <p:cSld>
-    <p:spTree>
-      <p:nvGrpSpPr>
-        <p:cNvPr id="1" name=""/>
-        <p:cNvGrpSpPr/>
-        <p:nvPr/>
-      </p:nvGrpSpPr>
-      <p:grpSpPr>
-        <a:xfrm>
-          <a:off x="0" y="0"/>
-          <a:ext cx="0" cy="0"/>
-          <a:chOff x="0" y="0"/>
-          <a:chExt cx="0" cy="0"/>
-        </a:xfrm>
-      </p:grpSpPr>
-      <p:sp>
-        <p:nvSpPr>
-          <p:cNvPr id="2" name="Title 1"/>
-          <p:cNvSpPr>
-            <a:spLocks noGrp="1"/>
-          </p:cNvSpPr>
-          <p:nvPr>
-            <p:ph type="title"/>
-          </p:nvPr>
-        </p:nvSpPr>
-        <p:spPr/>
-        <p:txBody>
-          <a:bodyPr/>
-          <a:lstStyle/>
-          <a:p>
-            <a:r>
-              <a:rPr lang="en-GB" dirty="0"/>
-              <a:t>Continuous Integration (CI) – cont.</a:t>
-            </a:r>
-          </a:p>
-        </p:txBody>
-      </p:sp>
-      <p:sp>
-        <p:nvSpPr>
-          <p:cNvPr id="5" name="Content Placeholder 4">
-            <a:extLst>
-              <a:ext uri="{FF2B5EF4-FFF2-40B4-BE49-F238E27FC236}">
-                <a16:creationId xmlns:a16="http://schemas.microsoft.com/office/drawing/2014/main" id="{E69B6396-C133-4371-A324-35DED18C6D3B}"/>
-              </a:ext>
-            </a:extLst>
-          </p:cNvPr>
-          <p:cNvSpPr>
-            <a:spLocks noGrp="1"/>
-          </p:cNvSpPr>
-          <p:nvPr>
-            <p:ph idx="1"/>
-          </p:nvPr>
-        </p:nvSpPr>
-        <p:spPr>
-          <a:xfrm>
-            <a:off x="3869268" y="324089"/>
-            <a:ext cx="7315200" cy="2234551"/>
-          </a:xfrm>
-        </p:spPr>
-        <p:txBody>
-          <a:bodyPr/>
-          <a:lstStyle/>
-          <a:p>
-            <a:r>
-              <a:rPr lang="en-GB" dirty="0"/>
-              <a:t>Feature-dev-main branches utilised; new feature for every new part</a:t>
-            </a:r>
-          </a:p>
-        </p:txBody>
-      </p:sp>
-      <p:pic>
-        <p:nvPicPr>
-          <p:cNvPr id="4" name="Picture 3">
-            <a:extLst>
-              <a:ext uri="{FF2B5EF4-FFF2-40B4-BE49-F238E27FC236}">
-                <a16:creationId xmlns:a16="http://schemas.microsoft.com/office/drawing/2014/main" id="{F1C28CAE-ED00-4FCA-9CC8-9E7A3B2924B6}"/>
-              </a:ext>
-            </a:extLst>
-          </p:cNvPr>
-          <p:cNvPicPr>
-            <a:picLocks noChangeAspect="1"/>
-          </p:cNvPicPr>
-          <p:nvPr/>
-        </p:nvPicPr>
-        <p:blipFill>
-          <a:blip r:embed="rId3"/>
-          <a:stretch>
-            <a:fillRect/>
-          </a:stretch>
-        </p:blipFill>
-        <p:spPr>
-          <a:xfrm>
-            <a:off x="3869268" y="1801281"/>
-            <a:ext cx="4324551" cy="4540779"/>
-          </a:xfrm>
-          <a:prstGeom prst="rect">
-            <a:avLst/>
-          </a:prstGeom>
-        </p:spPr>
-      </p:pic>
-    </p:spTree>
-    <p:extLst>
-      <p:ext uri="{BB962C8B-B14F-4D97-AF65-F5344CB8AC3E}">
-        <p14:creationId xmlns:p14="http://schemas.microsoft.com/office/powerpoint/2010/main" val="3871645530"/>
-      </p:ext>
-    </p:extLst>
-  </p:cSld>
-  <p:clrMapOvr>
-    <a:masterClrMapping/>
-  </p:clrMapOvr>
-</p:sld>
-</file>
-
-<file path=ppt/slides/slide6.xml><?xml version="1.0" encoding="utf-8"?>
-<p:sld xmlns:a="http://schemas.openxmlformats.org/drawingml/2006/main" xmlns:r="http://schemas.openxmlformats.org/officeDocument/2006/relationships" xmlns:p="http://schemas.openxmlformats.org/presentationml/2006/main">
-  <p:cSld>
-    <p:spTree>
-      <p:nvGrpSpPr>
-        <p:cNvPr id="1" name=""/>
-        <p:cNvGrpSpPr/>
-        <p:nvPr/>
-      </p:nvGrpSpPr>
-      <p:grpSpPr>
-        <a:xfrm>
-          <a:off x="0" y="0"/>
-          <a:ext cx="0" cy="0"/>
-          <a:chOff x="0" y="0"/>
-          <a:chExt cx="0" cy="0"/>
-        </a:xfrm>
-      </p:grpSpPr>
-      <p:sp>
-        <p:nvSpPr>
-          <p:cNvPr id="2" name="Title 1"/>
-          <p:cNvSpPr>
-            <a:spLocks noGrp="1"/>
-          </p:cNvSpPr>
-          <p:nvPr>
-            <p:ph type="title"/>
-          </p:nvPr>
-        </p:nvSpPr>
-        <p:spPr/>
-        <p:txBody>
-          <a:bodyPr/>
-          <a:lstStyle/>
-          <a:p>
-            <a:r>
-              <a:rPr lang="en-GB" dirty="0"/>
-              <a:t>Testing</a:t>
-            </a:r>
-          </a:p>
-        </p:txBody>
-      </p:sp>
-      <p:sp>
-        <p:nvSpPr>
-          <p:cNvPr id="5" name="Content Placeholder 4">
-            <a:extLst>
-              <a:ext uri="{FF2B5EF4-FFF2-40B4-BE49-F238E27FC236}">
-                <a16:creationId xmlns:a16="http://schemas.microsoft.com/office/drawing/2014/main" id="{E69B6396-C133-4371-A324-35DED18C6D3B}"/>
-              </a:ext>
-            </a:extLst>
-          </p:cNvPr>
-          <p:cNvSpPr>
-            <a:spLocks noGrp="1"/>
-          </p:cNvSpPr>
-          <p:nvPr>
-            <p:ph idx="1"/>
-          </p:nvPr>
-        </p:nvSpPr>
-        <p:spPr/>
-        <p:txBody>
-          <a:bodyPr/>
-          <a:lstStyle/>
-          <a:p>
-            <a:r>
-              <a:rPr lang="en-GB" dirty="0"/>
-              <a:t>Hardest part of the project</a:t>
-            </a:r>
-          </a:p>
-          <a:p>
-            <a:endParaRPr lang="en-GB" dirty="0"/>
-          </a:p>
-          <a:p>
-            <a:r>
-              <a:rPr lang="en-GB" dirty="0"/>
-              <a:t>Had the least amount of experience with</a:t>
-            </a:r>
-          </a:p>
-          <a:p>
-            <a:endParaRPr lang="en-GB" dirty="0"/>
-          </a:p>
-          <a:p>
-            <a:r>
-              <a:rPr lang="en-GB" dirty="0"/>
-              <a:t>Scope creep seriously hampered testing</a:t>
-            </a:r>
-          </a:p>
-        </p:txBody>
-      </p:sp>
-      <p:pic>
-        <p:nvPicPr>
-          <p:cNvPr id="3" name="Picture 2">
-            <a:extLst>
-              <a:ext uri="{FF2B5EF4-FFF2-40B4-BE49-F238E27FC236}">
-                <a16:creationId xmlns:a16="http://schemas.microsoft.com/office/drawing/2014/main" id="{9A529CC8-29AC-43B6-ABA3-C96DA6A88EC5}"/>
-              </a:ext>
-            </a:extLst>
-          </p:cNvPr>
-          <p:cNvPicPr>
-            <a:picLocks noChangeAspect="1"/>
-          </p:cNvPicPr>
-          <p:nvPr/>
-        </p:nvPicPr>
-        <p:blipFill>
-          <a:blip r:embed="rId3"/>
-          <a:stretch>
-            <a:fillRect/>
-          </a:stretch>
-        </p:blipFill>
-        <p:spPr>
-          <a:xfrm>
-            <a:off x="3446696" y="824194"/>
-            <a:ext cx="8323241" cy="1164263"/>
-          </a:xfrm>
-          <a:prstGeom prst="rect">
-            <a:avLst/>
-          </a:prstGeom>
-        </p:spPr>
-      </p:pic>
-    </p:spTree>
-    <p:extLst>
-      <p:ext uri="{BB962C8B-B14F-4D97-AF65-F5344CB8AC3E}">
-        <p14:creationId xmlns:p14="http://schemas.microsoft.com/office/powerpoint/2010/main" val="863844648"/>
-      </p:ext>
-    </p:extLst>
-  </p:cSld>
-  <p:clrMapOvr>
-    <a:masterClrMapping/>
-  </p:clrMapOvr>
-</p:sld>
-</file>
-
-<file path=ppt/slides/slide7.xml><?xml version="1.0" encoding="utf-8"?>
-<p:sld xmlns:a="http://schemas.openxmlformats.org/drawingml/2006/main" xmlns:r="http://schemas.openxmlformats.org/officeDocument/2006/relationships" xmlns:p="http://schemas.openxmlformats.org/presentationml/2006/main">
-  <p:cSld>
-    <p:spTree>
-      <p:nvGrpSpPr>
-        <p:cNvPr id="1" name=""/>
-        <p:cNvGrpSpPr/>
-        <p:nvPr/>
-      </p:nvGrpSpPr>
-      <p:grpSpPr>
-        <a:xfrm>
-          <a:off x="0" y="0"/>
-          <a:ext cx="0" cy="0"/>
-          <a:chOff x="0" y="0"/>
-          <a:chExt cx="0" cy="0"/>
-        </a:xfrm>
-      </p:grpSpPr>
-      <p:sp>
-        <p:nvSpPr>
-          <p:cNvPr id="2" name="Title 1"/>
-          <p:cNvSpPr>
-            <a:spLocks noGrp="1"/>
-          </p:cNvSpPr>
-          <p:nvPr>
-            <p:ph type="title"/>
-          </p:nvPr>
-        </p:nvSpPr>
         <p:spPr>
           <a:xfrm>
             <a:off x="0" y="1123837"/>
@@ -7011,7 +5507,7 @@
           <a:p>
             <a:r>
               <a:rPr lang="en-US" dirty="0"/>
-              <a:t>Demonstration – the Codebase</a:t>
+              <a:t>Demonstration – the Testing</a:t>
             </a:r>
             <a:endParaRPr lang="en-GB" dirty="0"/>
           </a:p>
@@ -7320,10 +5816,381 @@
       </p:sp>
       <p:pic>
         <p:nvPicPr>
+          <p:cNvPr id="4" name="Picture 3" descr="Graphical user interface, text, application&#10;&#10;Description automatically generated">
+            <a:extLst>
+              <a:ext uri="{FF2B5EF4-FFF2-40B4-BE49-F238E27FC236}">
+                <a16:creationId xmlns:a16="http://schemas.microsoft.com/office/drawing/2014/main" id="{14EDF449-E292-43AB-856E-E20B6BA679B5}"/>
+              </a:ext>
+            </a:extLst>
+          </p:cNvPr>
+          <p:cNvPicPr>
+            <a:picLocks noChangeAspect="1"/>
+          </p:cNvPicPr>
+          <p:nvPr/>
+        </p:nvPicPr>
+        <p:blipFill>
+          <a:blip r:embed="rId3">
+            <a:extLst>
+              <a:ext uri="{28A0092B-C50C-407E-A947-70E740481C1C}">
+                <a14:useLocalDpi xmlns:a14="http://schemas.microsoft.com/office/drawing/2010/main" val="0"/>
+              </a:ext>
+            </a:extLst>
+          </a:blip>
+          <a:stretch>
+            <a:fillRect/>
+          </a:stretch>
+        </p:blipFill>
+        <p:spPr>
+          <a:xfrm>
+            <a:off x="3599727" y="1736203"/>
+            <a:ext cx="7733678" cy="2563277"/>
+          </a:xfrm>
+          <a:prstGeom prst="rect">
+            <a:avLst/>
+          </a:prstGeom>
+        </p:spPr>
+      </p:pic>
+    </p:spTree>
+    <p:extLst>
+      <p:ext uri="{BB962C8B-B14F-4D97-AF65-F5344CB8AC3E}">
+        <p14:creationId xmlns:p14="http://schemas.microsoft.com/office/powerpoint/2010/main" val="3937458674"/>
+      </p:ext>
+    </p:extLst>
+  </p:cSld>
+  <p:clrMapOvr>
+    <a:masterClrMapping/>
+  </p:clrMapOvr>
+</p:sld>
+</file>
+
+<file path=ppt/slides/slide11.xml><?xml version="1.0" encoding="utf-8"?>
+<p:sld xmlns:a="http://schemas.openxmlformats.org/drawingml/2006/main" xmlns:r="http://schemas.openxmlformats.org/officeDocument/2006/relationships" xmlns:p="http://schemas.openxmlformats.org/presentationml/2006/main">
+  <p:cSld>
+    <p:spTree>
+      <p:nvGrpSpPr>
+        <p:cNvPr id="1" name=""/>
+        <p:cNvGrpSpPr/>
+        <p:nvPr/>
+      </p:nvGrpSpPr>
+      <p:grpSpPr>
+        <a:xfrm>
+          <a:off x="0" y="0"/>
+          <a:ext cx="0" cy="0"/>
+          <a:chOff x="0" y="0"/>
+          <a:chExt cx="0" cy="0"/>
+        </a:xfrm>
+      </p:grpSpPr>
+      <p:sp>
+        <p:nvSpPr>
+          <p:cNvPr id="2" name="Title 1"/>
+          <p:cNvSpPr>
+            <a:spLocks noGrp="1"/>
+          </p:cNvSpPr>
+          <p:nvPr>
+            <p:ph type="title"/>
+          </p:nvPr>
+        </p:nvSpPr>
+        <p:spPr/>
+        <p:txBody>
+          <a:bodyPr/>
+          <a:lstStyle/>
+          <a:p>
+            <a:r>
+              <a:rPr lang="en-US" dirty="0"/>
+              <a:t>Sprint Review </a:t>
+            </a:r>
+            <a:r>
+              <a:rPr lang="en-US"/>
+              <a:t>– What </a:t>
+            </a:r>
+            <a:r>
+              <a:rPr lang="en-US" dirty="0"/>
+              <a:t>was completed</a:t>
+            </a:r>
+            <a:endParaRPr lang="en-GB" dirty="0"/>
+          </a:p>
+        </p:txBody>
+      </p:sp>
+      <p:sp>
+        <p:nvSpPr>
+          <p:cNvPr id="4" name="Content Placeholder 3">
+            <a:extLst>
+              <a:ext uri="{FF2B5EF4-FFF2-40B4-BE49-F238E27FC236}">
+                <a16:creationId xmlns:a16="http://schemas.microsoft.com/office/drawing/2014/main" id="{8A63D6AF-67C1-4CF6-B7AB-4C171F448D4F}"/>
+              </a:ext>
+            </a:extLst>
+          </p:cNvPr>
+          <p:cNvSpPr>
+            <a:spLocks noGrp="1"/>
+          </p:cNvSpPr>
+          <p:nvPr>
+            <p:ph idx="1"/>
+          </p:nvPr>
+        </p:nvSpPr>
+        <p:spPr>
+          <a:xfrm>
+            <a:off x="3426208" y="750986"/>
+            <a:ext cx="7315200" cy="5120640"/>
+          </a:xfrm>
+        </p:spPr>
+        <p:txBody>
+          <a:bodyPr/>
+          <a:lstStyle/>
+          <a:p>
+            <a:pPr marL="0" indent="0">
+              <a:buNone/>
+            </a:pPr>
+            <a:endParaRPr lang="en-GB" dirty="0"/>
+          </a:p>
+          <a:p>
+            <a:r>
+              <a:rPr lang="en-GB" dirty="0"/>
+              <a:t>All Codebase aspects</a:t>
+            </a:r>
+          </a:p>
+          <a:p>
+            <a:endParaRPr lang="en-GB" dirty="0"/>
+          </a:p>
+          <a:p>
+            <a:r>
+              <a:rPr lang="en-GB" dirty="0"/>
+              <a:t>All Repository &amp; Documentation aspects</a:t>
+            </a:r>
+          </a:p>
+          <a:p>
+            <a:endParaRPr lang="en-GB" dirty="0"/>
+          </a:p>
+          <a:p>
+            <a:r>
+              <a:rPr lang="en-GB" dirty="0"/>
+              <a:t>All Continuous Integration aspects</a:t>
+            </a:r>
+          </a:p>
+          <a:p>
+            <a:endParaRPr lang="en-GB" dirty="0"/>
+          </a:p>
+          <a:p>
+            <a:r>
+              <a:rPr lang="en-GB" dirty="0"/>
+              <a:t>Nearly all Testing aspects</a:t>
+            </a:r>
+          </a:p>
+          <a:p>
+            <a:endParaRPr lang="en-GB" dirty="0"/>
+          </a:p>
+          <a:p>
+            <a:endParaRPr lang="en-GB" dirty="0"/>
+          </a:p>
+          <a:p>
+            <a:endParaRPr lang="en-GB" dirty="0"/>
+          </a:p>
+          <a:p>
+            <a:endParaRPr lang="en-GB" dirty="0"/>
+          </a:p>
+        </p:txBody>
+      </p:sp>
+    </p:spTree>
+    <p:extLst>
+      <p:ext uri="{BB962C8B-B14F-4D97-AF65-F5344CB8AC3E}">
+        <p14:creationId xmlns:p14="http://schemas.microsoft.com/office/powerpoint/2010/main" val="1473240061"/>
+      </p:ext>
+    </p:extLst>
+  </p:cSld>
+  <p:clrMapOvr>
+    <a:masterClrMapping/>
+  </p:clrMapOvr>
+</p:sld>
+</file>
+
+<file path=ppt/slides/slide12.xml><?xml version="1.0" encoding="utf-8"?>
+<p:sld xmlns:a="http://schemas.openxmlformats.org/drawingml/2006/main" xmlns:r="http://schemas.openxmlformats.org/officeDocument/2006/relationships" xmlns:p="http://schemas.openxmlformats.org/presentationml/2006/main">
+  <p:cSld>
+    <p:spTree>
+      <p:nvGrpSpPr>
+        <p:cNvPr id="1" name=""/>
+        <p:cNvGrpSpPr/>
+        <p:nvPr/>
+      </p:nvGrpSpPr>
+      <p:grpSpPr>
+        <a:xfrm>
+          <a:off x="0" y="0"/>
+          <a:ext cx="0" cy="0"/>
+          <a:chOff x="0" y="0"/>
+          <a:chExt cx="0" cy="0"/>
+        </a:xfrm>
+      </p:grpSpPr>
+      <p:sp>
+        <p:nvSpPr>
+          <p:cNvPr id="2" name="Title 1"/>
+          <p:cNvSpPr>
+            <a:spLocks noGrp="1"/>
+          </p:cNvSpPr>
+          <p:nvPr>
+            <p:ph type="title"/>
+          </p:nvPr>
+        </p:nvSpPr>
+        <p:spPr/>
+        <p:txBody>
+          <a:bodyPr/>
+          <a:lstStyle/>
+          <a:p>
+            <a:r>
+              <a:rPr lang="en-US" dirty="0"/>
+              <a:t>Sprint Review – What was abandoned</a:t>
+            </a:r>
+            <a:endParaRPr lang="en-GB" dirty="0"/>
+          </a:p>
+        </p:txBody>
+      </p:sp>
+      <p:sp>
+        <p:nvSpPr>
+          <p:cNvPr id="4" name="Content Placeholder 3">
+            <a:extLst>
+              <a:ext uri="{FF2B5EF4-FFF2-40B4-BE49-F238E27FC236}">
+                <a16:creationId xmlns:a16="http://schemas.microsoft.com/office/drawing/2014/main" id="{8A63D6AF-67C1-4CF6-B7AB-4C171F448D4F}"/>
+              </a:ext>
+            </a:extLst>
+          </p:cNvPr>
+          <p:cNvSpPr>
+            <a:spLocks noGrp="1"/>
+          </p:cNvSpPr>
+          <p:nvPr>
+            <p:ph idx="1"/>
+          </p:nvPr>
+        </p:nvSpPr>
+        <p:spPr>
+          <a:xfrm>
+            <a:off x="3426208" y="1665386"/>
+            <a:ext cx="7315200" cy="5120640"/>
+          </a:xfrm>
+        </p:spPr>
+        <p:txBody>
+          <a:bodyPr/>
+          <a:lstStyle/>
+          <a:p>
+            <a:pPr marL="0" indent="0">
+              <a:buNone/>
+            </a:pPr>
+            <a:r>
+              <a:rPr lang="en-GB" dirty="0"/>
+              <a:t>Front end testing – Selenium</a:t>
+            </a:r>
+          </a:p>
+        </p:txBody>
+      </p:sp>
+    </p:spTree>
+    <p:extLst>
+      <p:ext uri="{BB962C8B-B14F-4D97-AF65-F5344CB8AC3E}">
+        <p14:creationId xmlns:p14="http://schemas.microsoft.com/office/powerpoint/2010/main" val="3216747691"/>
+      </p:ext>
+    </p:extLst>
+  </p:cSld>
+  <p:clrMapOvr>
+    <a:masterClrMapping/>
+  </p:clrMapOvr>
+</p:sld>
+</file>
+
+<file path=ppt/slides/slide13.xml><?xml version="1.0" encoding="utf-8"?>
+<p:sld xmlns:a="http://schemas.openxmlformats.org/drawingml/2006/main" xmlns:r="http://schemas.openxmlformats.org/officeDocument/2006/relationships" xmlns:p="http://schemas.openxmlformats.org/presentationml/2006/main">
+  <p:cSld>
+    <p:spTree>
+      <p:nvGrpSpPr>
+        <p:cNvPr id="1" name=""/>
+        <p:cNvGrpSpPr/>
+        <p:nvPr/>
+      </p:nvGrpSpPr>
+      <p:grpSpPr>
+        <a:xfrm>
+          <a:off x="0" y="0"/>
+          <a:ext cx="0" cy="0"/>
+          <a:chOff x="0" y="0"/>
+          <a:chExt cx="0" cy="0"/>
+        </a:xfrm>
+      </p:grpSpPr>
+      <p:sp>
+        <p:nvSpPr>
+          <p:cNvPr id="2" name="Title 1"/>
+          <p:cNvSpPr>
+            <a:spLocks noGrp="1"/>
+          </p:cNvSpPr>
+          <p:nvPr>
+            <p:ph type="title"/>
+          </p:nvPr>
+        </p:nvSpPr>
+        <p:spPr/>
+        <p:txBody>
+          <a:bodyPr/>
+          <a:lstStyle/>
+          <a:p>
+            <a:r>
+              <a:rPr lang="en-US" dirty="0"/>
+              <a:t>Sprint Review – What was abandoned</a:t>
+            </a:r>
+            <a:endParaRPr lang="en-GB" dirty="0"/>
+          </a:p>
+        </p:txBody>
+      </p:sp>
+      <p:sp>
+        <p:nvSpPr>
+          <p:cNvPr id="4" name="Content Placeholder 3">
+            <a:extLst>
+              <a:ext uri="{FF2B5EF4-FFF2-40B4-BE49-F238E27FC236}">
+                <a16:creationId xmlns:a16="http://schemas.microsoft.com/office/drawing/2014/main" id="{8A63D6AF-67C1-4CF6-B7AB-4C171F448D4F}"/>
+              </a:ext>
+            </a:extLst>
+          </p:cNvPr>
+          <p:cNvSpPr>
+            <a:spLocks noGrp="1"/>
+          </p:cNvSpPr>
+          <p:nvPr>
+            <p:ph idx="1"/>
+          </p:nvPr>
+        </p:nvSpPr>
+        <p:spPr>
+          <a:xfrm>
+            <a:off x="3426208" y="2325143"/>
+            <a:ext cx="7315200" cy="5120640"/>
+          </a:xfrm>
+        </p:spPr>
+        <p:txBody>
+          <a:bodyPr/>
+          <a:lstStyle/>
+          <a:p>
+            <a:pPr marL="0" indent="0">
+              <a:buNone/>
+            </a:pPr>
+            <a:r>
+              <a:rPr lang="en-GB" dirty="0"/>
+              <a:t>SonarQube – static analysis</a:t>
+            </a:r>
+          </a:p>
+          <a:p>
+            <a:pPr marL="0" indent="0">
+              <a:buNone/>
+            </a:pPr>
+            <a:endParaRPr lang="en-GB" dirty="0"/>
+          </a:p>
+          <a:p>
+            <a:pPr marL="0" indent="0">
+              <a:buNone/>
+            </a:pPr>
+            <a:endParaRPr lang="en-GB" dirty="0"/>
+          </a:p>
+          <a:p>
+            <a:pPr marL="0" indent="0">
+              <a:buNone/>
+            </a:pPr>
+            <a:endParaRPr lang="en-GB" dirty="0"/>
+          </a:p>
+        </p:txBody>
+      </p:sp>
+      <p:pic>
+        <p:nvPicPr>
           <p:cNvPr id="5" name="Picture 4">
             <a:extLst>
               <a:ext uri="{FF2B5EF4-FFF2-40B4-BE49-F238E27FC236}">
-                <a16:creationId xmlns:a16="http://schemas.microsoft.com/office/drawing/2014/main" id="{7D04A61B-EEF5-44CA-B94B-0A60225E9F26}"/>
+                <a16:creationId xmlns:a16="http://schemas.microsoft.com/office/drawing/2014/main" id="{4AAF1575-6FC4-4E6E-9FF1-2CF45E27A569}"/>
               </a:ext>
             </a:extLst>
           </p:cNvPr>
@@ -7340,38 +6207,8 @@
         </p:blipFill>
         <p:spPr>
           <a:xfrm>
-            <a:off x="3487303" y="323915"/>
-            <a:ext cx="8322732" cy="4380942"/>
-          </a:xfrm>
-          <a:prstGeom prst="rect">
-            <a:avLst/>
-          </a:prstGeom>
-        </p:spPr>
-      </p:pic>
-      <p:pic>
-        <p:nvPicPr>
-          <p:cNvPr id="6" name="Picture 5">
-            <a:extLst>
-              <a:ext uri="{FF2B5EF4-FFF2-40B4-BE49-F238E27FC236}">
-                <a16:creationId xmlns:a16="http://schemas.microsoft.com/office/drawing/2014/main" id="{0045095A-1791-423F-B604-9BCB0EE2473D}"/>
-              </a:ext>
-            </a:extLst>
-          </p:cNvPr>
-          <p:cNvPicPr>
-            <a:picLocks noChangeAspect="1"/>
-          </p:cNvPicPr>
-          <p:nvPr/>
-        </p:nvPicPr>
-        <p:blipFill>
-          <a:blip r:embed="rId4"/>
-          <a:stretch>
-            <a:fillRect/>
-          </a:stretch>
-        </p:blipFill>
-        <p:spPr>
-          <a:xfrm>
-            <a:off x="3591742" y="4826738"/>
-            <a:ext cx="8113853" cy="1796563"/>
+            <a:off x="3426208" y="190299"/>
+            <a:ext cx="8310623" cy="3792075"/>
           </a:xfrm>
           <a:prstGeom prst="rect">
             <a:avLst/>
@@ -7381,7 +6218,7 @@
     </p:spTree>
     <p:extLst>
       <p:ext uri="{BB962C8B-B14F-4D97-AF65-F5344CB8AC3E}">
-        <p14:creationId xmlns:p14="http://schemas.microsoft.com/office/powerpoint/2010/main" val="3428831289"/>
+        <p14:creationId xmlns:p14="http://schemas.microsoft.com/office/powerpoint/2010/main" val="3106994033"/>
       </p:ext>
     </p:extLst>
   </p:cSld>
@@ -7391,7 +6228,7 @@
 </p:sld>
 </file>
 
-<file path=ppt/slides/slide8.xml><?xml version="1.0" encoding="utf-8"?>
+<file path=ppt/slides/slide14.xml><?xml version="1.0" encoding="utf-8"?>
 <p:sld xmlns:a="http://schemas.openxmlformats.org/drawingml/2006/main" xmlns:r="http://schemas.openxmlformats.org/officeDocument/2006/relationships" xmlns:p="http://schemas.openxmlformats.org/presentationml/2006/main">
   <p:cSld>
     <p:spTree>
@@ -7418,6 +6255,1020 @@
             <p:ph type="title"/>
           </p:nvPr>
         </p:nvSpPr>
+        <p:spPr/>
+        <p:txBody>
+          <a:bodyPr/>
+          <a:lstStyle/>
+          <a:p>
+            <a:r>
+              <a:rPr lang="en-GB" dirty="0"/>
+              <a:t>Sprint retrospective – what went well</a:t>
+            </a:r>
+          </a:p>
+        </p:txBody>
+      </p:sp>
+      <p:sp>
+        <p:nvSpPr>
+          <p:cNvPr id="5" name="Content Placeholder 4">
+            <a:extLst>
+              <a:ext uri="{FF2B5EF4-FFF2-40B4-BE49-F238E27FC236}">
+                <a16:creationId xmlns:a16="http://schemas.microsoft.com/office/drawing/2014/main" id="{7CB021C8-966B-4156-8C1C-1686E36B0B64}"/>
+              </a:ext>
+            </a:extLst>
+          </p:cNvPr>
+          <p:cNvSpPr>
+            <a:spLocks noGrp="1"/>
+          </p:cNvSpPr>
+          <p:nvPr>
+            <p:ph idx="1"/>
+          </p:nvPr>
+        </p:nvSpPr>
+        <p:spPr/>
+        <p:txBody>
+          <a:bodyPr/>
+          <a:lstStyle/>
+          <a:p>
+            <a:r>
+              <a:rPr lang="en-GB" dirty="0"/>
+              <a:t>MySQL </a:t>
+            </a:r>
+          </a:p>
+          <a:p>
+            <a:r>
+              <a:rPr lang="en-GB" dirty="0"/>
+              <a:t>Java</a:t>
+            </a:r>
+          </a:p>
+          <a:p>
+            <a:r>
+              <a:rPr lang="en-GB" dirty="0"/>
+              <a:t>Git</a:t>
+            </a:r>
+          </a:p>
+          <a:p>
+            <a:r>
+              <a:rPr lang="en-GB" dirty="0"/>
+              <a:t>GitHub</a:t>
+            </a:r>
+          </a:p>
+          <a:p>
+            <a:r>
+              <a:rPr lang="en-GB" dirty="0"/>
+              <a:t>Jira</a:t>
+            </a:r>
+          </a:p>
+          <a:p>
+            <a:r>
+              <a:rPr lang="en-GB" dirty="0"/>
+              <a:t>Spring</a:t>
+            </a:r>
+          </a:p>
+          <a:p>
+            <a:r>
+              <a:rPr lang="en-GB" dirty="0"/>
+              <a:t>HTML, CSS</a:t>
+            </a:r>
+          </a:p>
+          <a:p>
+            <a:r>
+              <a:rPr lang="en-GB" dirty="0"/>
+              <a:t>JavaScript</a:t>
+            </a:r>
+          </a:p>
+          <a:p>
+            <a:r>
+              <a:rPr lang="en-GB" dirty="0"/>
+              <a:t>Maven</a:t>
+            </a:r>
+          </a:p>
+          <a:p>
+            <a:r>
+              <a:rPr lang="en-GB" dirty="0"/>
+              <a:t>JUnit</a:t>
+            </a:r>
+          </a:p>
+          <a:p>
+            <a:endParaRPr lang="en-GB" dirty="0"/>
+          </a:p>
+        </p:txBody>
+      </p:sp>
+    </p:spTree>
+    <p:extLst>
+      <p:ext uri="{BB962C8B-B14F-4D97-AF65-F5344CB8AC3E}">
+        <p14:creationId xmlns:p14="http://schemas.microsoft.com/office/powerpoint/2010/main" val="3941797447"/>
+      </p:ext>
+    </p:extLst>
+  </p:cSld>
+  <p:clrMapOvr>
+    <a:masterClrMapping/>
+  </p:clrMapOvr>
+</p:sld>
+</file>
+
+<file path=ppt/slides/slide15.xml><?xml version="1.0" encoding="utf-8"?>
+<p:sld xmlns:a="http://schemas.openxmlformats.org/drawingml/2006/main" xmlns:r="http://schemas.openxmlformats.org/officeDocument/2006/relationships" xmlns:p="http://schemas.openxmlformats.org/presentationml/2006/main">
+  <p:cSld>
+    <p:spTree>
+      <p:nvGrpSpPr>
+        <p:cNvPr id="1" name=""/>
+        <p:cNvGrpSpPr/>
+        <p:nvPr/>
+      </p:nvGrpSpPr>
+      <p:grpSpPr>
+        <a:xfrm>
+          <a:off x="0" y="0"/>
+          <a:ext cx="0" cy="0"/>
+          <a:chOff x="0" y="0"/>
+          <a:chExt cx="0" cy="0"/>
+        </a:xfrm>
+      </p:grpSpPr>
+      <p:sp>
+        <p:nvSpPr>
+          <p:cNvPr id="2" name="Title 1"/>
+          <p:cNvSpPr>
+            <a:spLocks noGrp="1"/>
+          </p:cNvSpPr>
+          <p:nvPr>
+            <p:ph type="title"/>
+          </p:nvPr>
+        </p:nvSpPr>
+        <p:spPr/>
+        <p:txBody>
+          <a:bodyPr/>
+          <a:lstStyle/>
+          <a:p>
+            <a:r>
+              <a:rPr lang="en-US" dirty="0"/>
+              <a:t>Sprint retrospective – what could have been done better</a:t>
+            </a:r>
+            <a:endParaRPr lang="en-GB" dirty="0"/>
+          </a:p>
+        </p:txBody>
+      </p:sp>
+      <p:sp>
+        <p:nvSpPr>
+          <p:cNvPr id="3" name="Content Placeholder 2"/>
+          <p:cNvSpPr>
+            <a:spLocks noGrp="1"/>
+          </p:cNvSpPr>
+          <p:nvPr>
+            <p:ph idx="1"/>
+          </p:nvPr>
+        </p:nvSpPr>
+        <p:spPr>
+          <a:xfrm>
+            <a:off x="3445212" y="1583955"/>
+            <a:ext cx="7315200" cy="5120640"/>
+          </a:xfrm>
+        </p:spPr>
+        <p:txBody>
+          <a:bodyPr>
+            <a:normAutofit/>
+          </a:bodyPr>
+          <a:lstStyle/>
+          <a:p>
+            <a:r>
+              <a:rPr lang="en-GB" sz="3200" baseline="30000" dirty="0"/>
+              <a:t>Selenium</a:t>
+            </a:r>
+          </a:p>
+          <a:p>
+            <a:r>
+              <a:rPr lang="en-GB" sz="3200" baseline="30000" dirty="0"/>
+              <a:t>SonarQube</a:t>
+            </a:r>
+          </a:p>
+        </p:txBody>
+      </p:sp>
+    </p:spTree>
+    <p:extLst>
+      <p:ext uri="{BB962C8B-B14F-4D97-AF65-F5344CB8AC3E}">
+        <p14:creationId xmlns:p14="http://schemas.microsoft.com/office/powerpoint/2010/main" val="2743704402"/>
+      </p:ext>
+    </p:extLst>
+  </p:cSld>
+  <p:clrMapOvr>
+    <a:masterClrMapping/>
+  </p:clrMapOvr>
+</p:sld>
+</file>
+
+<file path=ppt/slides/slide16.xml><?xml version="1.0" encoding="utf-8"?>
+<p:sld xmlns:a="http://schemas.openxmlformats.org/drawingml/2006/main" xmlns:r="http://schemas.openxmlformats.org/officeDocument/2006/relationships" xmlns:p="http://schemas.openxmlformats.org/presentationml/2006/main">
+  <p:cSld>
+    <p:spTree>
+      <p:nvGrpSpPr>
+        <p:cNvPr id="1" name=""/>
+        <p:cNvGrpSpPr/>
+        <p:nvPr/>
+      </p:nvGrpSpPr>
+      <p:grpSpPr>
+        <a:xfrm>
+          <a:off x="0" y="0"/>
+          <a:ext cx="0" cy="0"/>
+          <a:chOff x="0" y="0"/>
+          <a:chExt cx="0" cy="0"/>
+        </a:xfrm>
+      </p:grpSpPr>
+      <p:sp>
+        <p:nvSpPr>
+          <p:cNvPr id="2" name="Title 1"/>
+          <p:cNvSpPr>
+            <a:spLocks noGrp="1"/>
+          </p:cNvSpPr>
+          <p:nvPr>
+            <p:ph type="title"/>
+          </p:nvPr>
+        </p:nvSpPr>
+        <p:spPr/>
+        <p:txBody>
+          <a:bodyPr/>
+          <a:lstStyle/>
+          <a:p>
+            <a:r>
+              <a:rPr lang="en-GB" dirty="0"/>
+              <a:t>Conclusions drawn</a:t>
+            </a:r>
+          </a:p>
+        </p:txBody>
+      </p:sp>
+      <p:sp>
+        <p:nvSpPr>
+          <p:cNvPr id="5" name="Content Placeholder 4">
+            <a:extLst>
+              <a:ext uri="{FF2B5EF4-FFF2-40B4-BE49-F238E27FC236}">
+                <a16:creationId xmlns:a16="http://schemas.microsoft.com/office/drawing/2014/main" id="{DB369E6E-40BA-416C-8274-4141D9EDA165}"/>
+              </a:ext>
+            </a:extLst>
+          </p:cNvPr>
+          <p:cNvSpPr>
+            <a:spLocks noGrp="1"/>
+          </p:cNvSpPr>
+          <p:nvPr>
+            <p:ph idx="1"/>
+          </p:nvPr>
+        </p:nvSpPr>
+        <p:spPr/>
+        <p:txBody>
+          <a:bodyPr/>
+          <a:lstStyle/>
+          <a:p>
+            <a:pPr marL="0" indent="0">
+              <a:buNone/>
+            </a:pPr>
+            <a:endParaRPr lang="en-GB" dirty="0"/>
+          </a:p>
+          <a:p>
+            <a:r>
+              <a:rPr lang="en-GB" b="1" dirty="0"/>
+              <a:t>1. Time allocation is key</a:t>
+            </a:r>
+          </a:p>
+          <a:p>
+            <a:endParaRPr lang="en-GB" b="1" dirty="0"/>
+          </a:p>
+          <a:p>
+            <a:r>
+              <a:rPr lang="en-GB" b="1" dirty="0"/>
+              <a:t>2.  Knowledge of Codebase-related content currently meets or is close to meeting expected standards</a:t>
+            </a:r>
+          </a:p>
+          <a:p>
+            <a:endParaRPr lang="en-GB" b="1" dirty="0"/>
+          </a:p>
+          <a:p>
+            <a:r>
+              <a:rPr lang="en-GB" b="1" dirty="0"/>
+              <a:t>3.  Additional front-end test practising will need to be conducted in spare time</a:t>
+            </a:r>
+          </a:p>
+          <a:p>
+            <a:endParaRPr lang="en-GB" b="1" dirty="0"/>
+          </a:p>
+          <a:p>
+            <a:r>
+              <a:rPr lang="en-GB" b="1" dirty="0"/>
+              <a:t>4.  A lack of time was the biggest reason for project shortcomings</a:t>
+            </a:r>
+          </a:p>
+          <a:p>
+            <a:endParaRPr lang="en-GB" dirty="0"/>
+          </a:p>
+        </p:txBody>
+      </p:sp>
+    </p:spTree>
+    <p:extLst>
+      <p:ext uri="{BB962C8B-B14F-4D97-AF65-F5344CB8AC3E}">
+        <p14:creationId xmlns:p14="http://schemas.microsoft.com/office/powerpoint/2010/main" val="3423769046"/>
+      </p:ext>
+    </p:extLst>
+  </p:cSld>
+  <p:clrMapOvr>
+    <a:masterClrMapping/>
+  </p:clrMapOvr>
+</p:sld>
+</file>
+
+<file path=ppt/slides/slide17.xml><?xml version="1.0" encoding="utf-8"?>
+<p:sld xmlns:a="http://schemas.openxmlformats.org/drawingml/2006/main" xmlns:r="http://schemas.openxmlformats.org/officeDocument/2006/relationships" xmlns:p="http://schemas.openxmlformats.org/presentationml/2006/main">
+  <p:cSld>
+    <p:spTree>
+      <p:nvGrpSpPr>
+        <p:cNvPr id="1" name=""/>
+        <p:cNvGrpSpPr/>
+        <p:nvPr/>
+      </p:nvGrpSpPr>
+      <p:grpSpPr>
+        <a:xfrm>
+          <a:off x="0" y="0"/>
+          <a:ext cx="0" cy="0"/>
+          <a:chOff x="0" y="0"/>
+          <a:chExt cx="0" cy="0"/>
+        </a:xfrm>
+      </p:grpSpPr>
+      <p:sp>
+        <p:nvSpPr>
+          <p:cNvPr id="2" name="Title 1"/>
+          <p:cNvSpPr>
+            <a:spLocks noGrp="1"/>
+          </p:cNvSpPr>
+          <p:nvPr>
+            <p:ph type="title"/>
+          </p:nvPr>
+        </p:nvSpPr>
+        <p:spPr/>
+        <p:txBody>
+          <a:bodyPr/>
+          <a:lstStyle/>
+          <a:p>
+            <a:r>
+              <a:rPr lang="en-GB" dirty="0"/>
+              <a:t>Conclusion</a:t>
+            </a:r>
+          </a:p>
+        </p:txBody>
+      </p:sp>
+      <p:sp>
+        <p:nvSpPr>
+          <p:cNvPr id="5" name="Content Placeholder 4">
+            <a:extLst>
+              <a:ext uri="{FF2B5EF4-FFF2-40B4-BE49-F238E27FC236}">
+                <a16:creationId xmlns:a16="http://schemas.microsoft.com/office/drawing/2014/main" id="{DB369E6E-40BA-416C-8274-4141D9EDA165}"/>
+              </a:ext>
+            </a:extLst>
+          </p:cNvPr>
+          <p:cNvSpPr>
+            <a:spLocks noGrp="1"/>
+          </p:cNvSpPr>
+          <p:nvPr>
+            <p:ph idx="1"/>
+          </p:nvPr>
+        </p:nvSpPr>
+        <p:spPr/>
+        <p:txBody>
+          <a:bodyPr/>
+          <a:lstStyle/>
+          <a:p>
+            <a:r>
+              <a:rPr lang="en-GB" b="1" dirty="0"/>
+              <a:t>Thank you for listening!</a:t>
+            </a:r>
+          </a:p>
+          <a:p>
+            <a:endParaRPr lang="en-GB" b="1" dirty="0"/>
+          </a:p>
+          <a:p>
+            <a:r>
+              <a:rPr lang="en-GB" b="1" dirty="0"/>
+              <a:t>Are there any questions?</a:t>
+            </a:r>
+          </a:p>
+        </p:txBody>
+      </p:sp>
+    </p:spTree>
+    <p:extLst>
+      <p:ext uri="{BB962C8B-B14F-4D97-AF65-F5344CB8AC3E}">
+        <p14:creationId xmlns:p14="http://schemas.microsoft.com/office/powerpoint/2010/main" val="4212480872"/>
+      </p:ext>
+    </p:extLst>
+  </p:cSld>
+  <p:clrMapOvr>
+    <a:masterClrMapping/>
+  </p:clrMapOvr>
+</p:sld>
+</file>
+
+<file path=ppt/slides/slide2.xml><?xml version="1.0" encoding="utf-8"?>
+<p:sld xmlns:a="http://schemas.openxmlformats.org/drawingml/2006/main" xmlns:r="http://schemas.openxmlformats.org/officeDocument/2006/relationships" xmlns:p="http://schemas.openxmlformats.org/presentationml/2006/main">
+  <p:cSld>
+    <p:spTree>
+      <p:nvGrpSpPr>
+        <p:cNvPr id="1" name=""/>
+        <p:cNvGrpSpPr/>
+        <p:nvPr/>
+      </p:nvGrpSpPr>
+      <p:grpSpPr>
+        <a:xfrm>
+          <a:off x="0" y="0"/>
+          <a:ext cx="0" cy="0"/>
+          <a:chOff x="0" y="0"/>
+          <a:chExt cx="0" cy="0"/>
+        </a:xfrm>
+      </p:grpSpPr>
+      <p:sp>
+        <p:nvSpPr>
+          <p:cNvPr id="2" name="Title 1"/>
+          <p:cNvSpPr>
+            <a:spLocks noGrp="1"/>
+          </p:cNvSpPr>
+          <p:nvPr>
+            <p:ph type="title"/>
+          </p:nvPr>
+        </p:nvSpPr>
+        <p:spPr/>
+        <p:txBody>
+          <a:bodyPr/>
+          <a:lstStyle/>
+          <a:p>
+            <a:r>
+              <a:rPr lang="en-GB" dirty="0"/>
+              <a:t>Introduction</a:t>
+            </a:r>
+          </a:p>
+        </p:txBody>
+      </p:sp>
+      <p:sp>
+        <p:nvSpPr>
+          <p:cNvPr id="3" name="Content Placeholder 2"/>
+          <p:cNvSpPr>
+            <a:spLocks noGrp="1"/>
+          </p:cNvSpPr>
+          <p:nvPr>
+            <p:ph idx="1"/>
+          </p:nvPr>
+        </p:nvSpPr>
+        <p:spPr>
+          <a:xfrm>
+            <a:off x="3445212" y="1583955"/>
+            <a:ext cx="7315200" cy="5120640"/>
+          </a:xfrm>
+        </p:spPr>
+        <p:txBody>
+          <a:bodyPr>
+            <a:normAutofit/>
+          </a:bodyPr>
+          <a:lstStyle/>
+          <a:p>
+            <a:r>
+              <a:rPr lang="en-GB" sz="2400" dirty="0"/>
+              <a:t>Hello! </a:t>
+            </a:r>
+          </a:p>
+          <a:p>
+            <a:endParaRPr lang="en-GB" sz="2400" dirty="0"/>
+          </a:p>
+          <a:p>
+            <a:r>
+              <a:rPr lang="en-GB" sz="2400" dirty="0"/>
+              <a:t>BSc Grad. Applied Computing</a:t>
+            </a:r>
+          </a:p>
+          <a:p>
+            <a:pPr marL="0" indent="0">
+              <a:buNone/>
+            </a:pPr>
+            <a:endParaRPr lang="en-GB" sz="2400" dirty="0"/>
+          </a:p>
+          <a:p>
+            <a:r>
+              <a:rPr lang="en-GB" sz="2400" dirty="0"/>
+              <a:t>Through focusing on the requirements and diligent work ethic, the project was completed </a:t>
+            </a:r>
+          </a:p>
+          <a:p>
+            <a:pPr marL="0" indent="0">
+              <a:buNone/>
+            </a:pPr>
+            <a:r>
+              <a:rPr lang="en-GB" sz="2400" dirty="0"/>
+              <a:t> </a:t>
+            </a:r>
+            <a:endParaRPr lang="en-GB" sz="2400" baseline="30000" dirty="0"/>
+          </a:p>
+        </p:txBody>
+      </p:sp>
+    </p:spTree>
+    <p:extLst>
+      <p:ext uri="{BB962C8B-B14F-4D97-AF65-F5344CB8AC3E}">
+        <p14:creationId xmlns:p14="http://schemas.microsoft.com/office/powerpoint/2010/main" val="1292386870"/>
+      </p:ext>
+    </p:extLst>
+  </p:cSld>
+  <p:clrMapOvr>
+    <a:masterClrMapping/>
+  </p:clrMapOvr>
+</p:sld>
+</file>
+
+<file path=ppt/slides/slide3.xml><?xml version="1.0" encoding="utf-8"?>
+<p:sld xmlns:a="http://schemas.openxmlformats.org/drawingml/2006/main" xmlns:r="http://schemas.openxmlformats.org/officeDocument/2006/relationships" xmlns:p="http://schemas.openxmlformats.org/presentationml/2006/main">
+  <p:cSld>
+    <p:spTree>
+      <p:nvGrpSpPr>
+        <p:cNvPr id="1" name=""/>
+        <p:cNvGrpSpPr/>
+        <p:nvPr/>
+      </p:nvGrpSpPr>
+      <p:grpSpPr>
+        <a:xfrm>
+          <a:off x="0" y="0"/>
+          <a:ext cx="0" cy="0"/>
+          <a:chOff x="0" y="0"/>
+          <a:chExt cx="0" cy="0"/>
+        </a:xfrm>
+      </p:grpSpPr>
+      <p:sp>
+        <p:nvSpPr>
+          <p:cNvPr id="2" name="Title 1"/>
+          <p:cNvSpPr>
+            <a:spLocks noGrp="1"/>
+          </p:cNvSpPr>
+          <p:nvPr>
+            <p:ph type="title"/>
+          </p:nvPr>
+        </p:nvSpPr>
+        <p:spPr/>
+        <p:txBody>
+          <a:bodyPr/>
+          <a:lstStyle/>
+          <a:p>
+            <a:r>
+              <a:rPr lang="en-GB" dirty="0"/>
+              <a:t>Consultant Journey</a:t>
+            </a:r>
+          </a:p>
+        </p:txBody>
+      </p:sp>
+      <p:sp>
+        <p:nvSpPr>
+          <p:cNvPr id="3" name="Content Placeholder 2"/>
+          <p:cNvSpPr>
+            <a:spLocks noGrp="1"/>
+          </p:cNvSpPr>
+          <p:nvPr>
+            <p:ph idx="1"/>
+          </p:nvPr>
+        </p:nvSpPr>
+        <p:spPr>
+          <a:xfrm>
+            <a:off x="3445212" y="1583955"/>
+            <a:ext cx="7315200" cy="5120640"/>
+          </a:xfrm>
+        </p:spPr>
+        <p:txBody>
+          <a:bodyPr>
+            <a:normAutofit/>
+          </a:bodyPr>
+          <a:lstStyle/>
+          <a:p>
+            <a:r>
+              <a:rPr lang="en-GB" dirty="0"/>
+              <a:t>Technologies I was already familiar with: Java, SQL, HTML &amp; CSS</a:t>
+            </a:r>
+          </a:p>
+          <a:p>
+            <a:endParaRPr lang="en-GB" dirty="0"/>
+          </a:p>
+          <a:p>
+            <a:r>
+              <a:rPr lang="en-GB" dirty="0"/>
+              <a:t>Technologies I’d used but not mastered: Git, GitHub, JavaScript, Jira, Maven, JUnit</a:t>
+            </a:r>
+          </a:p>
+          <a:p>
+            <a:endParaRPr lang="en-GB" dirty="0"/>
+          </a:p>
+          <a:p>
+            <a:r>
+              <a:rPr lang="en-GB" dirty="0"/>
+              <a:t>Technologies I’d never used before: Spring, SonarQube, Selenium</a:t>
+            </a:r>
+          </a:p>
+          <a:p>
+            <a:endParaRPr lang="en-US" dirty="0"/>
+          </a:p>
+          <a:p>
+            <a:pPr marL="0" indent="0">
+              <a:buNone/>
+            </a:pPr>
+            <a:endParaRPr lang="en-GB" sz="2400" baseline="30000" dirty="0"/>
+          </a:p>
+        </p:txBody>
+      </p:sp>
+    </p:spTree>
+    <p:extLst>
+      <p:ext uri="{BB962C8B-B14F-4D97-AF65-F5344CB8AC3E}">
+        <p14:creationId xmlns:p14="http://schemas.microsoft.com/office/powerpoint/2010/main" val="184584019"/>
+      </p:ext>
+    </p:extLst>
+  </p:cSld>
+  <p:clrMapOvr>
+    <a:masterClrMapping/>
+  </p:clrMapOvr>
+</p:sld>
+</file>
+
+<file path=ppt/slides/slide4.xml><?xml version="1.0" encoding="utf-8"?>
+<p:sld xmlns:a="http://schemas.openxmlformats.org/drawingml/2006/main" xmlns:r="http://schemas.openxmlformats.org/officeDocument/2006/relationships" xmlns:p="http://schemas.openxmlformats.org/presentationml/2006/main">
+  <p:cSld>
+    <p:spTree>
+      <p:nvGrpSpPr>
+        <p:cNvPr id="1" name=""/>
+        <p:cNvGrpSpPr/>
+        <p:nvPr/>
+      </p:nvGrpSpPr>
+      <p:grpSpPr>
+        <a:xfrm>
+          <a:off x="0" y="0"/>
+          <a:ext cx="0" cy="0"/>
+          <a:chOff x="0" y="0"/>
+          <a:chExt cx="0" cy="0"/>
+        </a:xfrm>
+      </p:grpSpPr>
+      <p:sp>
+        <p:nvSpPr>
+          <p:cNvPr id="2" name="Title 1"/>
+          <p:cNvSpPr>
+            <a:spLocks noGrp="1"/>
+          </p:cNvSpPr>
+          <p:nvPr>
+            <p:ph type="title"/>
+          </p:nvPr>
+        </p:nvSpPr>
+        <p:spPr/>
+        <p:txBody>
+          <a:bodyPr/>
+          <a:lstStyle/>
+          <a:p>
+            <a:r>
+              <a:rPr lang="en-GB" dirty="0"/>
+              <a:t>Continuous Integration (CI)</a:t>
+            </a:r>
+          </a:p>
+        </p:txBody>
+      </p:sp>
+      <p:sp>
+        <p:nvSpPr>
+          <p:cNvPr id="5" name="Content Placeholder 4">
+            <a:extLst>
+              <a:ext uri="{FF2B5EF4-FFF2-40B4-BE49-F238E27FC236}">
+                <a16:creationId xmlns:a16="http://schemas.microsoft.com/office/drawing/2014/main" id="{E69B6396-C133-4371-A324-35DED18C6D3B}"/>
+              </a:ext>
+            </a:extLst>
+          </p:cNvPr>
+          <p:cNvSpPr>
+            <a:spLocks noGrp="1"/>
+          </p:cNvSpPr>
+          <p:nvPr>
+            <p:ph idx="1"/>
+          </p:nvPr>
+        </p:nvSpPr>
+        <p:spPr>
+          <a:xfrm>
+            <a:off x="3869268" y="324089"/>
+            <a:ext cx="7315200" cy="2234551"/>
+          </a:xfrm>
+        </p:spPr>
+        <p:txBody>
+          <a:bodyPr/>
+          <a:lstStyle/>
+          <a:p>
+            <a:r>
+              <a:rPr lang="en-GB" dirty="0"/>
+              <a:t>Version control was approached with industry standards in mind</a:t>
+            </a:r>
+          </a:p>
+        </p:txBody>
+      </p:sp>
+      <p:pic>
+        <p:nvPicPr>
+          <p:cNvPr id="6" name="Picture 5">
+            <a:extLst>
+              <a:ext uri="{FF2B5EF4-FFF2-40B4-BE49-F238E27FC236}">
+                <a16:creationId xmlns:a16="http://schemas.microsoft.com/office/drawing/2014/main" id="{39C6246C-D311-4235-9177-CF391FB0EFAC}"/>
+              </a:ext>
+            </a:extLst>
+          </p:cNvPr>
+          <p:cNvPicPr>
+            <a:picLocks noChangeAspect="1"/>
+          </p:cNvPicPr>
+          <p:nvPr/>
+        </p:nvPicPr>
+        <p:blipFill>
+          <a:blip r:embed="rId3"/>
+          <a:stretch>
+            <a:fillRect/>
+          </a:stretch>
+        </p:blipFill>
+        <p:spPr>
+          <a:xfrm>
+            <a:off x="3715472" y="1771610"/>
+            <a:ext cx="7949253" cy="3305636"/>
+          </a:xfrm>
+          <a:prstGeom prst="rect">
+            <a:avLst/>
+          </a:prstGeom>
+        </p:spPr>
+      </p:pic>
+    </p:spTree>
+    <p:extLst>
+      <p:ext uri="{BB962C8B-B14F-4D97-AF65-F5344CB8AC3E}">
+        <p14:creationId xmlns:p14="http://schemas.microsoft.com/office/powerpoint/2010/main" val="3196788493"/>
+      </p:ext>
+    </p:extLst>
+  </p:cSld>
+  <p:clrMapOvr>
+    <a:masterClrMapping/>
+  </p:clrMapOvr>
+</p:sld>
+</file>
+
+<file path=ppt/slides/slide5.xml><?xml version="1.0" encoding="utf-8"?>
+<p:sld xmlns:a="http://schemas.openxmlformats.org/drawingml/2006/main" xmlns:r="http://schemas.openxmlformats.org/officeDocument/2006/relationships" xmlns:p="http://schemas.openxmlformats.org/presentationml/2006/main">
+  <p:cSld>
+    <p:spTree>
+      <p:nvGrpSpPr>
+        <p:cNvPr id="1" name=""/>
+        <p:cNvGrpSpPr/>
+        <p:nvPr/>
+      </p:nvGrpSpPr>
+      <p:grpSpPr>
+        <a:xfrm>
+          <a:off x="0" y="0"/>
+          <a:ext cx="0" cy="0"/>
+          <a:chOff x="0" y="0"/>
+          <a:chExt cx="0" cy="0"/>
+        </a:xfrm>
+      </p:grpSpPr>
+      <p:sp>
+        <p:nvSpPr>
+          <p:cNvPr id="2" name="Title 1"/>
+          <p:cNvSpPr>
+            <a:spLocks noGrp="1"/>
+          </p:cNvSpPr>
+          <p:nvPr>
+            <p:ph type="title"/>
+          </p:nvPr>
+        </p:nvSpPr>
+        <p:spPr/>
+        <p:txBody>
+          <a:bodyPr/>
+          <a:lstStyle/>
+          <a:p>
+            <a:r>
+              <a:rPr lang="en-GB" dirty="0"/>
+              <a:t>Continuous Integration (CI) – cont.</a:t>
+            </a:r>
+          </a:p>
+        </p:txBody>
+      </p:sp>
+      <p:sp>
+        <p:nvSpPr>
+          <p:cNvPr id="5" name="Content Placeholder 4">
+            <a:extLst>
+              <a:ext uri="{FF2B5EF4-FFF2-40B4-BE49-F238E27FC236}">
+                <a16:creationId xmlns:a16="http://schemas.microsoft.com/office/drawing/2014/main" id="{E69B6396-C133-4371-A324-35DED18C6D3B}"/>
+              </a:ext>
+            </a:extLst>
+          </p:cNvPr>
+          <p:cNvSpPr>
+            <a:spLocks noGrp="1"/>
+          </p:cNvSpPr>
+          <p:nvPr>
+            <p:ph idx="1"/>
+          </p:nvPr>
+        </p:nvSpPr>
+        <p:spPr>
+          <a:xfrm>
+            <a:off x="3869268" y="324089"/>
+            <a:ext cx="7315200" cy="2234551"/>
+          </a:xfrm>
+        </p:spPr>
+        <p:txBody>
+          <a:bodyPr/>
+          <a:lstStyle/>
+          <a:p>
+            <a:r>
+              <a:rPr lang="en-GB" dirty="0"/>
+              <a:t>Feature-dev-main branches utilised</a:t>
+            </a:r>
+          </a:p>
+        </p:txBody>
+      </p:sp>
+      <p:pic>
+        <p:nvPicPr>
+          <p:cNvPr id="6" name="Picture 5">
+            <a:extLst>
+              <a:ext uri="{FF2B5EF4-FFF2-40B4-BE49-F238E27FC236}">
+                <a16:creationId xmlns:a16="http://schemas.microsoft.com/office/drawing/2014/main" id="{D63719C3-1ECD-4C31-89A4-6B38E70DDD25}"/>
+              </a:ext>
+            </a:extLst>
+          </p:cNvPr>
+          <p:cNvPicPr>
+            <a:picLocks noChangeAspect="1"/>
+          </p:cNvPicPr>
+          <p:nvPr/>
+        </p:nvPicPr>
+        <p:blipFill>
+          <a:blip r:embed="rId3"/>
+          <a:stretch>
+            <a:fillRect/>
+          </a:stretch>
+        </p:blipFill>
+        <p:spPr>
+          <a:xfrm>
+            <a:off x="3583607" y="2152717"/>
+            <a:ext cx="7122976" cy="3362794"/>
+          </a:xfrm>
+          <a:prstGeom prst="rect">
+            <a:avLst/>
+          </a:prstGeom>
+        </p:spPr>
+      </p:pic>
+    </p:spTree>
+    <p:extLst>
+      <p:ext uri="{BB962C8B-B14F-4D97-AF65-F5344CB8AC3E}">
+        <p14:creationId xmlns:p14="http://schemas.microsoft.com/office/powerpoint/2010/main" val="3871645530"/>
+      </p:ext>
+    </p:extLst>
+  </p:cSld>
+  <p:clrMapOvr>
+    <a:masterClrMapping/>
+  </p:clrMapOvr>
+</p:sld>
+</file>
+
+<file path=ppt/slides/slide6.xml><?xml version="1.0" encoding="utf-8"?>
+<p:sld xmlns:a="http://schemas.openxmlformats.org/drawingml/2006/main" xmlns:r="http://schemas.openxmlformats.org/officeDocument/2006/relationships" xmlns:p="http://schemas.openxmlformats.org/presentationml/2006/main">
+  <p:cSld>
+    <p:spTree>
+      <p:nvGrpSpPr>
+        <p:cNvPr id="1" name=""/>
+        <p:cNvGrpSpPr/>
+        <p:nvPr/>
+      </p:nvGrpSpPr>
+      <p:grpSpPr>
+        <a:xfrm>
+          <a:off x="0" y="0"/>
+          <a:ext cx="0" cy="0"/>
+          <a:chOff x="0" y="0"/>
+          <a:chExt cx="0" cy="0"/>
+        </a:xfrm>
+      </p:grpSpPr>
+      <p:sp>
+        <p:nvSpPr>
+          <p:cNvPr id="2" name="Title 1"/>
+          <p:cNvSpPr>
+            <a:spLocks noGrp="1"/>
+          </p:cNvSpPr>
+          <p:nvPr>
+            <p:ph type="title"/>
+          </p:nvPr>
+        </p:nvSpPr>
+        <p:spPr/>
+        <p:txBody>
+          <a:bodyPr/>
+          <a:lstStyle/>
+          <a:p>
+            <a:r>
+              <a:rPr lang="en-GB" dirty="0"/>
+              <a:t>Testing</a:t>
+            </a:r>
+          </a:p>
+        </p:txBody>
+      </p:sp>
+      <p:sp>
+        <p:nvSpPr>
+          <p:cNvPr id="5" name="Content Placeholder 4">
+            <a:extLst>
+              <a:ext uri="{FF2B5EF4-FFF2-40B4-BE49-F238E27FC236}">
+                <a16:creationId xmlns:a16="http://schemas.microsoft.com/office/drawing/2014/main" id="{E69B6396-C133-4371-A324-35DED18C6D3B}"/>
+              </a:ext>
+            </a:extLst>
+          </p:cNvPr>
+          <p:cNvSpPr>
+            <a:spLocks noGrp="1"/>
+          </p:cNvSpPr>
+          <p:nvPr>
+            <p:ph idx="1"/>
+          </p:nvPr>
+        </p:nvSpPr>
+        <p:spPr/>
+        <p:txBody>
+          <a:bodyPr/>
+          <a:lstStyle/>
+          <a:p>
+            <a:r>
+              <a:rPr lang="en-GB" dirty="0"/>
+              <a:t>Much easier experience testing than previously</a:t>
+            </a:r>
+          </a:p>
+          <a:p>
+            <a:endParaRPr lang="en-GB" dirty="0"/>
+          </a:p>
+          <a:p>
+            <a:r>
+              <a:rPr lang="en-GB" dirty="0"/>
+              <a:t>Had the least amount of experience with</a:t>
+            </a:r>
+          </a:p>
+          <a:p>
+            <a:endParaRPr lang="en-GB" dirty="0"/>
+          </a:p>
+          <a:p>
+            <a:r>
+              <a:rPr lang="en-GB" dirty="0"/>
+              <a:t>With just a few weeks to process the concepts, was able to get it &gt;80%</a:t>
+            </a:r>
+          </a:p>
+        </p:txBody>
+      </p:sp>
+      <p:pic>
+        <p:nvPicPr>
+          <p:cNvPr id="6" name="Picture 5">
+            <a:extLst>
+              <a:ext uri="{FF2B5EF4-FFF2-40B4-BE49-F238E27FC236}">
+                <a16:creationId xmlns:a16="http://schemas.microsoft.com/office/drawing/2014/main" id="{481748B8-C77C-4793-88A2-00BA48604685}"/>
+              </a:ext>
+            </a:extLst>
+          </p:cNvPr>
+          <p:cNvPicPr>
+            <a:picLocks noChangeAspect="1"/>
+          </p:cNvPicPr>
+          <p:nvPr/>
+        </p:nvPicPr>
+        <p:blipFill>
+          <a:blip r:embed="rId3">
+            <a:extLst>
+              <a:ext uri="{28A0092B-C50C-407E-A947-70E740481C1C}">
+                <a14:useLocalDpi xmlns:a14="http://schemas.microsoft.com/office/drawing/2010/main" val="0"/>
+              </a:ext>
+            </a:extLst>
+          </a:blip>
+          <a:stretch>
+            <a:fillRect/>
+          </a:stretch>
+        </p:blipFill>
+        <p:spPr>
+          <a:xfrm>
+            <a:off x="3437326" y="75199"/>
+            <a:ext cx="6516902" cy="2097276"/>
+          </a:xfrm>
+          <a:prstGeom prst="rect">
+            <a:avLst/>
+          </a:prstGeom>
+        </p:spPr>
+      </p:pic>
+    </p:spTree>
+    <p:extLst>
+      <p:ext uri="{BB962C8B-B14F-4D97-AF65-F5344CB8AC3E}">
+        <p14:creationId xmlns:p14="http://schemas.microsoft.com/office/powerpoint/2010/main" val="863844648"/>
+      </p:ext>
+    </p:extLst>
+  </p:cSld>
+  <p:clrMapOvr>
+    <a:masterClrMapping/>
+  </p:clrMapOvr>
+</p:sld>
+</file>
+
+<file path=ppt/slides/slide7.xml><?xml version="1.0" encoding="utf-8"?>
+<p:sld xmlns:a="http://schemas.openxmlformats.org/drawingml/2006/main" xmlns:r="http://schemas.openxmlformats.org/officeDocument/2006/relationships" xmlns:p="http://schemas.openxmlformats.org/presentationml/2006/main">
+  <p:cSld>
+    <p:spTree>
+      <p:nvGrpSpPr>
+        <p:cNvPr id="1" name=""/>
+        <p:cNvGrpSpPr/>
+        <p:nvPr/>
+      </p:nvGrpSpPr>
+      <p:grpSpPr>
+        <a:xfrm>
+          <a:off x="0" y="0"/>
+          <a:ext cx="0" cy="0"/>
+          <a:chOff x="0" y="0"/>
+          <a:chExt cx="0" cy="0"/>
+        </a:xfrm>
+      </p:grpSpPr>
+      <p:sp>
+        <p:nvSpPr>
+          <p:cNvPr id="2" name="Title 1"/>
+          <p:cNvSpPr>
+            <a:spLocks noGrp="1"/>
+          </p:cNvSpPr>
+          <p:nvPr>
+            <p:ph type="title"/>
+          </p:nvPr>
+        </p:nvSpPr>
         <p:spPr>
           <a:xfrm>
             <a:off x="0" y="1123837"/>
@@ -7430,7 +7281,7 @@
           <a:p>
             <a:r>
               <a:rPr lang="en-US" dirty="0"/>
-              <a:t>Demonstration – the IMS repo</a:t>
+              <a:t>Demonstration – the Codebase</a:t>
             </a:r>
             <a:endParaRPr lang="en-GB" dirty="0"/>
           </a:p>
@@ -7742,7 +7593,7 @@
           <p:cNvPr id="4" name="Picture 3">
             <a:extLst>
               <a:ext uri="{FF2B5EF4-FFF2-40B4-BE49-F238E27FC236}">
-                <a16:creationId xmlns:a16="http://schemas.microsoft.com/office/drawing/2014/main" id="{A4932966-5064-4F5D-A3A5-BE6896A55E3A}"/>
+                <a16:creationId xmlns:a16="http://schemas.microsoft.com/office/drawing/2014/main" id="{390FD669-E44F-4480-B711-D4267283AB9B}"/>
               </a:ext>
             </a:extLst>
           </p:cNvPr>
@@ -7752,134 +7603,21 @@
           <p:nvPr/>
         </p:nvPicPr>
         <p:blipFill>
-          <a:blip r:embed="rId3"/>
+          <a:blip r:embed="rId3">
+            <a:extLst>
+              <a:ext uri="{28A0092B-C50C-407E-A947-70E740481C1C}">
+                <a14:useLocalDpi xmlns:a14="http://schemas.microsoft.com/office/drawing/2010/main" val="0"/>
+              </a:ext>
+            </a:extLst>
+          </a:blip>
           <a:stretch>
             <a:fillRect/>
           </a:stretch>
         </p:blipFill>
         <p:spPr>
           <a:xfrm>
-            <a:off x="3599727" y="5233763"/>
-            <a:ext cx="8300127" cy="1520268"/>
-          </a:xfrm>
-          <a:prstGeom prst="rect">
-            <a:avLst/>
-          </a:prstGeom>
-        </p:spPr>
-      </p:pic>
-      <p:pic>
-        <p:nvPicPr>
-          <p:cNvPr id="6" name="Picture 5">
-            <a:extLst>
-              <a:ext uri="{FF2B5EF4-FFF2-40B4-BE49-F238E27FC236}">
-                <a16:creationId xmlns:a16="http://schemas.microsoft.com/office/drawing/2014/main" id="{3401CB4E-6124-41FF-943C-F2D1FC6F338F}"/>
-              </a:ext>
-            </a:extLst>
-          </p:cNvPr>
-          <p:cNvPicPr>
-            <a:picLocks noChangeAspect="1"/>
-          </p:cNvPicPr>
-          <p:nvPr/>
-        </p:nvPicPr>
-        <p:blipFill rotWithShape="1">
-          <a:blip r:embed="rId4"/>
-          <a:srcRect b="21562"/>
-          <a:stretch/>
-        </p:blipFill>
-        <p:spPr>
-          <a:xfrm>
-            <a:off x="3490037" y="722751"/>
-            <a:ext cx="3599728" cy="1747907"/>
-          </a:xfrm>
-          <a:prstGeom prst="rect">
-            <a:avLst/>
-          </a:prstGeom>
-        </p:spPr>
-      </p:pic>
-      <p:pic>
-        <p:nvPicPr>
-          <p:cNvPr id="7" name="Picture 6">
-            <a:extLst>
-              <a:ext uri="{FF2B5EF4-FFF2-40B4-BE49-F238E27FC236}">
-                <a16:creationId xmlns:a16="http://schemas.microsoft.com/office/drawing/2014/main" id="{E874F2B3-6572-4A21-995C-2107D221C958}"/>
-              </a:ext>
-            </a:extLst>
-          </p:cNvPr>
-          <p:cNvPicPr>
-            <a:picLocks noChangeAspect="1"/>
-          </p:cNvPicPr>
-          <p:nvPr/>
-        </p:nvPicPr>
-        <p:blipFill>
-          <a:blip r:embed="rId5"/>
-          <a:stretch>
-            <a:fillRect/>
-          </a:stretch>
-        </p:blipFill>
-        <p:spPr>
-          <a:xfrm>
-            <a:off x="7179667" y="722751"/>
-            <a:ext cx="3684953" cy="1747907"/>
-          </a:xfrm>
-          <a:prstGeom prst="rect">
-            <a:avLst/>
-          </a:prstGeom>
-        </p:spPr>
-      </p:pic>
-      <p:pic>
-        <p:nvPicPr>
-          <p:cNvPr id="9" name="Picture 8">
-            <a:extLst>
-              <a:ext uri="{FF2B5EF4-FFF2-40B4-BE49-F238E27FC236}">
-                <a16:creationId xmlns:a16="http://schemas.microsoft.com/office/drawing/2014/main" id="{C14B2BC5-E4BD-408C-850C-FF52EA1F505E}"/>
-              </a:ext>
-            </a:extLst>
-          </p:cNvPr>
-          <p:cNvPicPr>
-            <a:picLocks noChangeAspect="1"/>
-          </p:cNvPicPr>
-          <p:nvPr/>
-        </p:nvPicPr>
-        <p:blipFill>
-          <a:blip r:embed="rId6"/>
-          <a:stretch>
-            <a:fillRect/>
-          </a:stretch>
-        </p:blipFill>
-        <p:spPr>
-          <a:xfrm>
-            <a:off x="3490037" y="2688674"/>
-            <a:ext cx="3599727" cy="1796869"/>
-          </a:xfrm>
-          <a:prstGeom prst="rect">
-            <a:avLst/>
-          </a:prstGeom>
-        </p:spPr>
-      </p:pic>
-      <p:pic>
-        <p:nvPicPr>
-          <p:cNvPr id="10" name="Picture 9">
-            <a:extLst>
-              <a:ext uri="{FF2B5EF4-FFF2-40B4-BE49-F238E27FC236}">
-                <a16:creationId xmlns:a16="http://schemas.microsoft.com/office/drawing/2014/main" id="{5C9FCD4B-533B-4CB2-B49D-615950BB324B}"/>
-              </a:ext>
-            </a:extLst>
-          </p:cNvPr>
-          <p:cNvPicPr>
-            <a:picLocks noChangeAspect="1"/>
-          </p:cNvPicPr>
-          <p:nvPr/>
-        </p:nvPicPr>
-        <p:blipFill>
-          <a:blip r:embed="rId7"/>
-          <a:stretch>
-            <a:fillRect/>
-          </a:stretch>
-        </p:blipFill>
-        <p:spPr>
-          <a:xfrm>
-            <a:off x="7179666" y="2688674"/>
-            <a:ext cx="4161220" cy="1650014"/>
+            <a:off x="3401475" y="733993"/>
+            <a:ext cx="8494386" cy="5380869"/>
           </a:xfrm>
           <a:prstGeom prst="rect">
             <a:avLst/>
@@ -7889,7 +7627,7 @@
     </p:spTree>
     <p:extLst>
       <p:ext uri="{BB962C8B-B14F-4D97-AF65-F5344CB8AC3E}">
-        <p14:creationId xmlns:p14="http://schemas.microsoft.com/office/powerpoint/2010/main" val="4280334421"/>
+        <p14:creationId xmlns:p14="http://schemas.microsoft.com/office/powerpoint/2010/main" val="3428831289"/>
       </p:ext>
     </p:extLst>
   </p:cSld>
@@ -7899,7 +7637,7 @@
 </p:sld>
 </file>
 
-<file path=ppt/slides/slide9.xml><?xml version="1.0" encoding="utf-8"?>
+<file path=ppt/slides/slide8.xml><?xml version="1.0" encoding="utf-8"?>
 <p:sld xmlns:a="http://schemas.openxmlformats.org/drawingml/2006/main" xmlns:r="http://schemas.openxmlformats.org/officeDocument/2006/relationships" xmlns:p="http://schemas.openxmlformats.org/presentationml/2006/main">
   <p:cSld>
     <p:spTree>
@@ -7938,7 +7676,7 @@
           <a:p>
             <a:r>
               <a:rPr lang="en-US" dirty="0"/>
-              <a:t>Demonstration – the Documentation</a:t>
+              <a:t>Demonstration – the IMS repo</a:t>
             </a:r>
             <a:endParaRPr lang="en-GB" dirty="0"/>
           </a:p>
@@ -8247,10 +7985,10 @@
       </p:sp>
       <p:pic>
         <p:nvPicPr>
-          <p:cNvPr id="3" name="Picture 2">
+          <p:cNvPr id="5" name="Picture 4" descr="Graphical user interface, text, application&#10;&#10;Description automatically generated">
             <a:extLst>
               <a:ext uri="{FF2B5EF4-FFF2-40B4-BE49-F238E27FC236}">
-                <a16:creationId xmlns:a16="http://schemas.microsoft.com/office/drawing/2014/main" id="{635092CD-38CD-4473-8E96-EDE0EE5422A5}"/>
+                <a16:creationId xmlns:a16="http://schemas.microsoft.com/office/drawing/2014/main" id="{E0384718-C40B-4EA0-9B7C-BF1A61C32496}"/>
               </a:ext>
             </a:extLst>
           </p:cNvPr>
@@ -8260,27 +7998,392 @@
           <p:nvPr/>
         </p:nvPicPr>
         <p:blipFill>
-          <a:blip r:embed="rId3"/>
+          <a:blip r:embed="rId3">
+            <a:extLst>
+              <a:ext uri="{28A0092B-C50C-407E-A947-70E740481C1C}">
+                <a14:useLocalDpi xmlns:a14="http://schemas.microsoft.com/office/drawing/2010/main" val="0"/>
+              </a:ext>
+            </a:extLst>
+          </a:blip>
           <a:stretch>
             <a:fillRect/>
           </a:stretch>
         </p:blipFill>
         <p:spPr>
           <a:xfrm>
-            <a:off x="3599727" y="716427"/>
-            <a:ext cx="8092251" cy="3986202"/>
+            <a:off x="3413449" y="1503370"/>
+            <a:ext cx="8489489" cy="3510753"/>
           </a:xfrm>
           <a:prstGeom prst="rect">
             <a:avLst/>
           </a:prstGeom>
         </p:spPr>
       </p:pic>
+    </p:spTree>
+    <p:extLst>
+      <p:ext uri="{BB962C8B-B14F-4D97-AF65-F5344CB8AC3E}">
+        <p14:creationId xmlns:p14="http://schemas.microsoft.com/office/powerpoint/2010/main" val="4280334421"/>
+      </p:ext>
+    </p:extLst>
+  </p:cSld>
+  <p:clrMapOvr>
+    <a:masterClrMapping/>
+  </p:clrMapOvr>
+</p:sld>
+</file>
+
+<file path=ppt/slides/slide9.xml><?xml version="1.0" encoding="utf-8"?>
+<p:sld xmlns:a="http://schemas.openxmlformats.org/drawingml/2006/main" xmlns:r="http://schemas.openxmlformats.org/officeDocument/2006/relationships" xmlns:p="http://schemas.openxmlformats.org/presentationml/2006/main">
+  <p:cSld>
+    <p:spTree>
+      <p:nvGrpSpPr>
+        <p:cNvPr id="1" name=""/>
+        <p:cNvGrpSpPr/>
+        <p:nvPr/>
+      </p:nvGrpSpPr>
+      <p:grpSpPr>
+        <a:xfrm>
+          <a:off x="0" y="0"/>
+          <a:ext cx="0" cy="0"/>
+          <a:chOff x="0" y="0"/>
+          <a:chExt cx="0" cy="0"/>
+        </a:xfrm>
+      </p:grpSpPr>
+      <p:sp>
+        <p:nvSpPr>
+          <p:cNvPr id="2" name="Title 1"/>
+          <p:cNvSpPr>
+            <a:spLocks noGrp="1"/>
+          </p:cNvSpPr>
+          <p:nvPr>
+            <p:ph type="title"/>
+          </p:nvPr>
+        </p:nvSpPr>
+        <p:spPr>
+          <a:xfrm>
+            <a:off x="0" y="1123837"/>
+            <a:ext cx="3599727" cy="4601183"/>
+          </a:xfrm>
+        </p:spPr>
+        <p:txBody>
+          <a:bodyPr/>
+          <a:lstStyle/>
+          <a:p>
+            <a:r>
+              <a:rPr lang="en-US" dirty="0"/>
+              <a:t>Demonstration – the Documentation</a:t>
+            </a:r>
+            <a:endParaRPr lang="en-GB" dirty="0"/>
+          </a:p>
+        </p:txBody>
+      </p:sp>
+      <p:sp>
+        <p:nvSpPr>
+          <p:cNvPr id="8" name="Content Placeholder 3">
+            <a:extLst>
+              <a:ext uri="{FF2B5EF4-FFF2-40B4-BE49-F238E27FC236}">
+                <a16:creationId xmlns:a16="http://schemas.microsoft.com/office/drawing/2014/main" id="{465FAF36-D962-4579-AF60-FE84A4DA471F}"/>
+              </a:ext>
+            </a:extLst>
+          </p:cNvPr>
+          <p:cNvSpPr txBox="1">
+            <a:spLocks/>
+          </p:cNvSpPr>
+          <p:nvPr/>
+        </p:nvSpPr>
+        <p:spPr>
+          <a:xfrm>
+            <a:off x="3689629" y="2312668"/>
+            <a:ext cx="7315200" cy="5120640"/>
+          </a:xfrm>
+          <a:prstGeom prst="rect">
+            <a:avLst/>
+          </a:prstGeom>
+        </p:spPr>
+        <p:txBody>
+          <a:bodyPr vert="horz" lIns="91440" tIns="45720" rIns="91440" bIns="45720" rtlCol="0" anchor="ctr">
+            <a:normAutofit/>
+          </a:bodyPr>
+          <a:lstStyle>
+            <a:lvl1pPr marL="182880" indent="-182880" algn="l" defTabSz="914400" rtl="0" eaLnBrk="1" latinLnBrk="0" hangingPunct="1">
+              <a:lnSpc>
+                <a:spcPct val="90000"/>
+              </a:lnSpc>
+              <a:spcBef>
+                <a:spcPts val="1200"/>
+              </a:spcBef>
+              <a:buClr>
+                <a:schemeClr val="accent1"/>
+              </a:buClr>
+              <a:buFont typeface="Wingdings 2" pitchFamily="18" charset="2"/>
+              <a:buChar char=""/>
+              <a:tabLst>
+                <a:tab pos="1143000" algn="l"/>
+              </a:tabLst>
+              <a:defRPr sz="2000" kern="1200">
+                <a:solidFill>
+                  <a:schemeClr val="bg2">
+                    <a:lumMod val="20000"/>
+                    <a:lumOff val="80000"/>
+                  </a:schemeClr>
+                </a:solidFill>
+                <a:latin typeface="+mn-lt"/>
+                <a:ea typeface="+mn-ea"/>
+                <a:cs typeface="+mn-cs"/>
+              </a:defRPr>
+            </a:lvl1pPr>
+            <a:lvl2pPr marL="685800" indent="-182880" algn="l" defTabSz="914400" rtl="0" eaLnBrk="1" latinLnBrk="0" hangingPunct="1">
+              <a:lnSpc>
+                <a:spcPct val="90000"/>
+              </a:lnSpc>
+              <a:spcBef>
+                <a:spcPts val="250"/>
+              </a:spcBef>
+              <a:spcAft>
+                <a:spcPts val="250"/>
+              </a:spcAft>
+              <a:buClr>
+                <a:schemeClr val="accent1"/>
+              </a:buClr>
+              <a:buFont typeface="Wingdings 2" pitchFamily="18" charset="2"/>
+              <a:buChar char=""/>
+              <a:tabLst>
+                <a:tab pos="1143000" algn="l"/>
+              </a:tabLst>
+              <a:defRPr sz="1800" kern="1200">
+                <a:solidFill>
+                  <a:schemeClr val="bg2">
+                    <a:lumMod val="20000"/>
+                    <a:lumOff val="80000"/>
+                  </a:schemeClr>
+                </a:solidFill>
+                <a:latin typeface="+mn-lt"/>
+                <a:ea typeface="+mn-ea"/>
+                <a:cs typeface="+mn-cs"/>
+              </a:defRPr>
+            </a:lvl2pPr>
+            <a:lvl3pPr marL="1143000" indent="-182880" algn="l" defTabSz="914400" rtl="0" eaLnBrk="1" latinLnBrk="0" hangingPunct="1">
+              <a:lnSpc>
+                <a:spcPct val="90000"/>
+              </a:lnSpc>
+              <a:spcBef>
+                <a:spcPts val="250"/>
+              </a:spcBef>
+              <a:spcAft>
+                <a:spcPts val="250"/>
+              </a:spcAft>
+              <a:buClr>
+                <a:schemeClr val="accent1"/>
+              </a:buClr>
+              <a:buFont typeface="Wingdings 2" pitchFamily="18" charset="2"/>
+              <a:buChar char=""/>
+              <a:tabLst>
+                <a:tab pos="1143000" algn="l"/>
+              </a:tabLst>
+              <a:defRPr sz="1600" kern="1200">
+                <a:solidFill>
+                  <a:schemeClr val="bg2">
+                    <a:lumMod val="20000"/>
+                    <a:lumOff val="80000"/>
+                  </a:schemeClr>
+                </a:solidFill>
+                <a:latin typeface="+mn-lt"/>
+                <a:ea typeface="+mn-ea"/>
+                <a:cs typeface="+mn-cs"/>
+              </a:defRPr>
+            </a:lvl3pPr>
+            <a:lvl4pPr marL="1600200" indent="-182880" algn="l" defTabSz="914400" rtl="0" eaLnBrk="1" latinLnBrk="0" hangingPunct="1">
+              <a:lnSpc>
+                <a:spcPct val="90000"/>
+              </a:lnSpc>
+              <a:spcBef>
+                <a:spcPts val="250"/>
+              </a:spcBef>
+              <a:spcAft>
+                <a:spcPts val="250"/>
+              </a:spcAft>
+              <a:buClr>
+                <a:schemeClr val="accent1"/>
+              </a:buClr>
+              <a:buFont typeface="Wingdings 2" pitchFamily="18" charset="2"/>
+              <a:buChar char=""/>
+              <a:tabLst>
+                <a:tab pos="1143000" algn="l"/>
+              </a:tabLst>
+              <a:defRPr sz="1400" kern="1200">
+                <a:solidFill>
+                  <a:schemeClr val="bg2">
+                    <a:lumMod val="20000"/>
+                    <a:lumOff val="80000"/>
+                  </a:schemeClr>
+                </a:solidFill>
+                <a:latin typeface="+mn-lt"/>
+                <a:ea typeface="+mn-ea"/>
+                <a:cs typeface="+mn-cs"/>
+              </a:defRPr>
+            </a:lvl4pPr>
+            <a:lvl5pPr marL="2057400" indent="-182880" algn="l" defTabSz="914400" rtl="0" eaLnBrk="1" latinLnBrk="0" hangingPunct="1">
+              <a:lnSpc>
+                <a:spcPct val="90000"/>
+              </a:lnSpc>
+              <a:spcBef>
+                <a:spcPts val="250"/>
+              </a:spcBef>
+              <a:spcAft>
+                <a:spcPts val="250"/>
+              </a:spcAft>
+              <a:buClr>
+                <a:schemeClr val="accent1"/>
+              </a:buClr>
+              <a:buFont typeface="Wingdings 2" pitchFamily="18" charset="2"/>
+              <a:buChar char=""/>
+              <a:tabLst>
+                <a:tab pos="1143000" algn="l"/>
+              </a:tabLst>
+              <a:defRPr sz="1400" kern="1200">
+                <a:solidFill>
+                  <a:schemeClr val="bg2">
+                    <a:lumMod val="20000"/>
+                    <a:lumOff val="80000"/>
+                  </a:schemeClr>
+                </a:solidFill>
+                <a:latin typeface="+mn-lt"/>
+                <a:ea typeface="+mn-ea"/>
+                <a:cs typeface="+mn-cs"/>
+              </a:defRPr>
+            </a:lvl5pPr>
+            <a:lvl6pPr marL="2514600" indent="-228600" algn="l" defTabSz="914400" rtl="0" eaLnBrk="1" latinLnBrk="0" hangingPunct="1">
+              <a:lnSpc>
+                <a:spcPct val="90000"/>
+              </a:lnSpc>
+              <a:spcBef>
+                <a:spcPts val="250"/>
+              </a:spcBef>
+              <a:spcAft>
+                <a:spcPts val="250"/>
+              </a:spcAft>
+              <a:buClr>
+                <a:schemeClr val="accent1"/>
+              </a:buClr>
+              <a:buFont typeface="Wingdings 2" pitchFamily="18" charset="2"/>
+              <a:buChar char=""/>
+              <a:tabLst>
+                <a:tab pos="1143000" algn="l"/>
+              </a:tabLst>
+              <a:defRPr sz="1400" kern="1200">
+                <a:solidFill>
+                  <a:schemeClr val="bg2">
+                    <a:lumMod val="20000"/>
+                    <a:lumOff val="80000"/>
+                  </a:schemeClr>
+                </a:solidFill>
+                <a:latin typeface="+mn-lt"/>
+                <a:ea typeface="+mn-ea"/>
+                <a:cs typeface="+mn-cs"/>
+              </a:defRPr>
+            </a:lvl6pPr>
+            <a:lvl7pPr marL="2971800" indent="-228600" algn="l" defTabSz="914400" rtl="0" eaLnBrk="1" latinLnBrk="0" hangingPunct="1">
+              <a:lnSpc>
+                <a:spcPct val="90000"/>
+              </a:lnSpc>
+              <a:spcBef>
+                <a:spcPts val="250"/>
+              </a:spcBef>
+              <a:spcAft>
+                <a:spcPts val="250"/>
+              </a:spcAft>
+              <a:buClr>
+                <a:schemeClr val="accent1"/>
+              </a:buClr>
+              <a:buFont typeface="Wingdings 2" pitchFamily="18" charset="2"/>
+              <a:buChar char=""/>
+              <a:tabLst>
+                <a:tab pos="1143000" algn="l"/>
+              </a:tabLst>
+              <a:defRPr sz="1400" kern="1200">
+                <a:solidFill>
+                  <a:schemeClr val="bg2">
+                    <a:lumMod val="20000"/>
+                    <a:lumOff val="80000"/>
+                  </a:schemeClr>
+                </a:solidFill>
+                <a:latin typeface="+mn-lt"/>
+                <a:ea typeface="+mn-ea"/>
+                <a:cs typeface="+mn-cs"/>
+              </a:defRPr>
+            </a:lvl7pPr>
+            <a:lvl8pPr marL="3429000" indent="-228600" algn="l" defTabSz="914400" rtl="0" eaLnBrk="1" latinLnBrk="0" hangingPunct="1">
+              <a:lnSpc>
+                <a:spcPct val="90000"/>
+              </a:lnSpc>
+              <a:spcBef>
+                <a:spcPts val="250"/>
+              </a:spcBef>
+              <a:spcAft>
+                <a:spcPts val="250"/>
+              </a:spcAft>
+              <a:buClr>
+                <a:schemeClr val="accent1"/>
+              </a:buClr>
+              <a:buFont typeface="Wingdings 2" pitchFamily="18" charset="2"/>
+              <a:buChar char=""/>
+              <a:tabLst>
+                <a:tab pos="1143000" algn="l"/>
+              </a:tabLst>
+              <a:defRPr sz="1400" kern="1200">
+                <a:solidFill>
+                  <a:schemeClr val="bg2">
+                    <a:lumMod val="20000"/>
+                    <a:lumOff val="80000"/>
+                  </a:schemeClr>
+                </a:solidFill>
+                <a:latin typeface="+mn-lt"/>
+                <a:ea typeface="+mn-ea"/>
+                <a:cs typeface="+mn-cs"/>
+              </a:defRPr>
+            </a:lvl8pPr>
+            <a:lvl9pPr marL="3886200" indent="-228600" algn="l" defTabSz="914400" rtl="0" eaLnBrk="1" latinLnBrk="0" hangingPunct="1">
+              <a:lnSpc>
+                <a:spcPct val="90000"/>
+              </a:lnSpc>
+              <a:spcBef>
+                <a:spcPts val="250"/>
+              </a:spcBef>
+              <a:spcAft>
+                <a:spcPts val="250"/>
+              </a:spcAft>
+              <a:buClr>
+                <a:schemeClr val="accent1"/>
+              </a:buClr>
+              <a:buFont typeface="Wingdings 2" pitchFamily="18" charset="2"/>
+              <a:buChar char=""/>
+              <a:tabLst>
+                <a:tab pos="1143000" algn="l"/>
+              </a:tabLst>
+              <a:defRPr sz="1400" kern="1200">
+                <a:solidFill>
+                  <a:schemeClr val="bg2">
+                    <a:lumMod val="20000"/>
+                    <a:lumOff val="80000"/>
+                  </a:schemeClr>
+                </a:solidFill>
+                <a:latin typeface="+mn-lt"/>
+                <a:ea typeface="+mn-ea"/>
+                <a:cs typeface="+mn-cs"/>
+              </a:defRPr>
+            </a:lvl9pPr>
+          </a:lstStyle>
+          <a:p>
+            <a:endParaRPr lang="en-GB" dirty="0"/>
+          </a:p>
+        </p:txBody>
+      </p:sp>
       <p:pic>
         <p:nvPicPr>
-          <p:cNvPr id="4" name="Picture 3">
+          <p:cNvPr id="6" name="Picture 5" descr="Graphical user interface, text, application, email&#10;&#10;Description automatically generated">
             <a:extLst>
               <a:ext uri="{FF2B5EF4-FFF2-40B4-BE49-F238E27FC236}">
-                <a16:creationId xmlns:a16="http://schemas.microsoft.com/office/drawing/2014/main" id="{13D4B6D9-AD04-47FE-B0A2-A7DF235509E2}"/>
+                <a16:creationId xmlns:a16="http://schemas.microsoft.com/office/drawing/2014/main" id="{A7936C1B-0AD5-4880-9E94-FDB785555CB0}"/>
               </a:ext>
             </a:extLst>
           </p:cNvPr>
@@ -8290,15 +8393,21 @@
           <p:nvPr/>
         </p:nvPicPr>
         <p:blipFill>
-          <a:blip r:embed="rId4"/>
+          <a:blip r:embed="rId3">
+            <a:extLst>
+              <a:ext uri="{28A0092B-C50C-407E-A947-70E740481C1C}">
+                <a14:useLocalDpi xmlns:a14="http://schemas.microsoft.com/office/drawing/2010/main" val="0"/>
+              </a:ext>
+            </a:extLst>
+          </a:blip>
           <a:stretch>
             <a:fillRect/>
           </a:stretch>
         </p:blipFill>
         <p:spPr>
           <a:xfrm>
-            <a:off x="3599727" y="4734903"/>
-            <a:ext cx="8092251" cy="1406670"/>
+            <a:off x="3518702" y="2277518"/>
+            <a:ext cx="8148579" cy="2293819"/>
           </a:xfrm>
           <a:prstGeom prst="rect">
             <a:avLst/>

</xml_diff>